<commit_message>
added ppt with future enhancement
</commit_message>
<xml_diff>
--- a/Ticket_Automation/WS/Docs/PPT/final_review_template.pptx
+++ b/Ticket_Automation/WS/Docs/PPT/final_review_template.pptx
@@ -5,7 +5,7 @@
     <p:sldMasterId id="2147483684" r:id="rId1"/>
   </p:sldMasterIdLst>
   <p:notesMasterIdLst>
-    <p:notesMasterId r:id="rId34"/>
+    <p:notesMasterId r:id="rId35"/>
   </p:notesMasterIdLst>
   <p:sldIdLst>
     <p:sldId id="258" r:id="rId2"/>
@@ -13,33 +13,34 @@
     <p:sldId id="259" r:id="rId4"/>
     <p:sldId id="260" r:id="rId5"/>
     <p:sldId id="267" r:id="rId6"/>
-    <p:sldId id="261" r:id="rId7"/>
-    <p:sldId id="263" r:id="rId8"/>
-    <p:sldId id="266" r:id="rId9"/>
-    <p:sldId id="284" r:id="rId10"/>
-    <p:sldId id="285" r:id="rId11"/>
-    <p:sldId id="270" r:id="rId12"/>
-    <p:sldId id="286" r:id="rId13"/>
-    <p:sldId id="271" r:id="rId14"/>
-    <p:sldId id="290" r:id="rId15"/>
-    <p:sldId id="272" r:id="rId16"/>
-    <p:sldId id="291" r:id="rId17"/>
-    <p:sldId id="281" r:id="rId18"/>
-    <p:sldId id="278" r:id="rId19"/>
-    <p:sldId id="279" r:id="rId20"/>
-    <p:sldId id="282" r:id="rId21"/>
-    <p:sldId id="288" r:id="rId22"/>
-    <p:sldId id="289" r:id="rId23"/>
-    <p:sldId id="294" r:id="rId24"/>
-    <p:sldId id="295" r:id="rId25"/>
-    <p:sldId id="296" r:id="rId26"/>
-    <p:sldId id="293" r:id="rId27"/>
-    <p:sldId id="297" r:id="rId28"/>
-    <p:sldId id="298" r:id="rId29"/>
-    <p:sldId id="299" r:id="rId30"/>
-    <p:sldId id="300" r:id="rId31"/>
-    <p:sldId id="301" r:id="rId32"/>
-    <p:sldId id="268" r:id="rId33"/>
+    <p:sldId id="302" r:id="rId7"/>
+    <p:sldId id="261" r:id="rId8"/>
+    <p:sldId id="263" r:id="rId9"/>
+    <p:sldId id="266" r:id="rId10"/>
+    <p:sldId id="284" r:id="rId11"/>
+    <p:sldId id="285" r:id="rId12"/>
+    <p:sldId id="270" r:id="rId13"/>
+    <p:sldId id="286" r:id="rId14"/>
+    <p:sldId id="271" r:id="rId15"/>
+    <p:sldId id="290" r:id="rId16"/>
+    <p:sldId id="272" r:id="rId17"/>
+    <p:sldId id="291" r:id="rId18"/>
+    <p:sldId id="281" r:id="rId19"/>
+    <p:sldId id="278" r:id="rId20"/>
+    <p:sldId id="279" r:id="rId21"/>
+    <p:sldId id="282" r:id="rId22"/>
+    <p:sldId id="288" r:id="rId23"/>
+    <p:sldId id="289" r:id="rId24"/>
+    <p:sldId id="294" r:id="rId25"/>
+    <p:sldId id="295" r:id="rId26"/>
+    <p:sldId id="296" r:id="rId27"/>
+    <p:sldId id="293" r:id="rId28"/>
+    <p:sldId id="297" r:id="rId29"/>
+    <p:sldId id="298" r:id="rId30"/>
+    <p:sldId id="299" r:id="rId31"/>
+    <p:sldId id="300" r:id="rId32"/>
+    <p:sldId id="301" r:id="rId33"/>
+    <p:sldId id="268" r:id="rId34"/>
   </p:sldIdLst>
   <p:sldSz cx="9144000" cy="6858000" type="screen4x3"/>
   <p:notesSz cx="6858000" cy="9144000"/>
@@ -4710,10 +4711,10 @@
       </p:grpSpPr>
       <p:sp>
         <p:nvSpPr>
-          <p:cNvPr id="27" name="Frame 26">
+          <p:cNvPr id="5" name="Rectangle 4">
             <a:extLst>
               <a:ext uri="{FF2B5EF4-FFF2-40B4-BE49-F238E27FC236}">
-                <a16:creationId xmlns:a16="http://schemas.microsoft.com/office/drawing/2014/main" id="{D2F9FAF2-8357-4698-A3DD-30FB4A421171}"/>
+                <a16:creationId xmlns:a16="http://schemas.microsoft.com/office/drawing/2014/main" id="{B7EF1466-35E1-4A92-9595-5180D18FA1FE}"/>
               </a:ext>
             </a:extLst>
           </p:cNvPr>
@@ -4722,8 +4723,850 @@
         </p:nvSpPr>
         <p:spPr>
           <a:xfrm>
-            <a:off x="185416" y="2552089"/>
-            <a:ext cx="1008112" cy="720080"/>
+            <a:off x="1600200" y="863234"/>
+            <a:ext cx="5256584" cy="461663"/>
+          </a:xfrm>
+          <a:prstGeom prst="rect">
+            <a:avLst/>
+          </a:prstGeom>
+          <a:solidFill>
+            <a:srgbClr val="FFFFFF"/>
+          </a:solidFill>
+          <a:ln w="25400" cap="flat">
+            <a:solidFill>
+              <a:schemeClr val="accent1"/>
+            </a:solidFill>
+            <a:prstDash val="solid"/>
+            <a:round/>
+          </a:ln>
+          <a:effectLst>
+            <a:outerShdw blurRad="63500" dist="38100" dir="5400000" rotWithShape="0">
+              <a:srgbClr val="032544">
+                <a:alpha val="48000"/>
+              </a:srgbClr>
+            </a:outerShdw>
+          </a:effectLst>
+          <a:sp3d/>
+        </p:spPr>
+        <p:style>
+          <a:lnRef idx="0">
+            <a:scrgbClr r="0" g="0" b="0"/>
+          </a:lnRef>
+          <a:fillRef idx="0">
+            <a:scrgbClr r="0" g="0" b="0"/>
+          </a:fillRef>
+          <a:effectRef idx="0">
+            <a:scrgbClr r="0" g="0" b="0"/>
+          </a:effectRef>
+          <a:fontRef idx="none"/>
+        </p:style>
+        <p:txBody>
+          <a:bodyPr rot="0" spcFirstLastPara="1" vertOverflow="overflow" horzOverflow="overflow" vert="horz" wrap="square" lIns="45719" tIns="45719" rIns="45719" bIns="45719" numCol="1" spcCol="38100" rtlCol="0" anchor="ctr">
+            <a:spAutoFit/>
+          </a:bodyPr>
+          <a:lstStyle/>
+          <a:p>
+            <a:r>
+              <a:rPr kumimoji="0" lang="en-IN" sz="2400" b="0" i="0" u="none" strike="noStrike" cap="none" spc="0" normalizeH="0" baseline="0" dirty="0">
+                <a:ln>
+                  <a:noFill/>
+                </a:ln>
+                <a:solidFill>
+                  <a:srgbClr val="000000"/>
+                </a:solidFill>
+                <a:effectLst/>
+                <a:uFillTx/>
+                <a:latin typeface="Constantia"/>
+                <a:ea typeface="Constantia"/>
+                <a:cs typeface="Constantia"/>
+                <a:sym typeface="Constantia"/>
+              </a:rPr>
+              <a:t>               Data flow Diagram – Level </a:t>
+            </a:r>
+            <a:r>
+              <a:rPr lang="en-US" sz="2400" dirty="0">
+                <a:latin typeface="Times New Roman" pitchFamily="18" charset="0"/>
+                <a:cs typeface="Times New Roman" pitchFamily="18" charset="0"/>
+              </a:rPr>
+              <a:t>0</a:t>
+            </a:r>
+            <a:endParaRPr kumimoji="0" lang="en-IN" sz="2400" b="0" i="0" u="none" strike="noStrike" cap="none" spc="0" normalizeH="0" baseline="0" dirty="0">
+              <a:ln>
+                <a:noFill/>
+              </a:ln>
+              <a:solidFill>
+                <a:srgbClr val="000000"/>
+              </a:solidFill>
+              <a:effectLst/>
+              <a:uFillTx/>
+              <a:latin typeface="Constantia"/>
+              <a:ea typeface="Constantia"/>
+              <a:cs typeface="Constantia"/>
+              <a:sym typeface="Constantia"/>
+            </a:endParaRPr>
+          </a:p>
+        </p:txBody>
+      </p:sp>
+      <p:sp>
+        <p:nvSpPr>
+          <p:cNvPr id="6" name="Oval 5">
+            <a:extLst>
+              <a:ext uri="{FF2B5EF4-FFF2-40B4-BE49-F238E27FC236}">
+                <a16:creationId xmlns:a16="http://schemas.microsoft.com/office/drawing/2014/main" id="{CC6262A9-06F0-4EBB-8BBD-F697815B0CD3}"/>
+              </a:ext>
+            </a:extLst>
+          </p:cNvPr>
+          <p:cNvSpPr/>
+          <p:nvPr/>
+        </p:nvSpPr>
+        <p:spPr>
+          <a:xfrm>
+            <a:off x="3074351" y="1995686"/>
+            <a:ext cx="1512168" cy="908861"/>
+          </a:xfrm>
+          <a:prstGeom prst="ellipse">
+            <a:avLst/>
+          </a:prstGeom>
+          <a:solidFill>
+            <a:srgbClr val="FFFFFF"/>
+          </a:solidFill>
+          <a:ln w="25400" cap="flat">
+            <a:solidFill>
+              <a:schemeClr val="accent1"/>
+            </a:solidFill>
+            <a:prstDash val="solid"/>
+            <a:round/>
+          </a:ln>
+          <a:effectLst>
+            <a:outerShdw blurRad="63500" dist="38100" dir="5400000" rotWithShape="0">
+              <a:srgbClr val="032544">
+                <a:alpha val="48000"/>
+              </a:srgbClr>
+            </a:outerShdw>
+          </a:effectLst>
+          <a:sp3d/>
+        </p:spPr>
+        <p:style>
+          <a:lnRef idx="0">
+            <a:scrgbClr r="0" g="0" b="0"/>
+          </a:lnRef>
+          <a:fillRef idx="0">
+            <a:scrgbClr r="0" g="0" b="0"/>
+          </a:fillRef>
+          <a:effectRef idx="0">
+            <a:scrgbClr r="0" g="0" b="0"/>
+          </a:effectRef>
+          <a:fontRef idx="none"/>
+        </p:style>
+        <p:txBody>
+          <a:bodyPr rot="0" spcFirstLastPara="1" vertOverflow="overflow" horzOverflow="overflow" vert="horz" wrap="square" lIns="45719" tIns="45719" rIns="45719" bIns="45719" numCol="1" spcCol="38100" rtlCol="0" anchor="ctr">
+            <a:spAutoFit/>
+          </a:bodyPr>
+          <a:lstStyle/>
+          <a:p>
+            <a:pPr marL="0" marR="0" indent="0" algn="l" defTabSz="914400" rtl="0" fontAlgn="auto" latinLnBrk="0" hangingPunct="0">
+              <a:lnSpc>
+                <a:spcPct val="100000"/>
+              </a:lnSpc>
+              <a:spcBef>
+                <a:spcPts val="0"/>
+              </a:spcBef>
+              <a:spcAft>
+                <a:spcPts val="0"/>
+              </a:spcAft>
+              <a:buClrTx/>
+              <a:buSzTx/>
+              <a:buFontTx/>
+              <a:buNone/>
+              <a:tabLst/>
+            </a:pPr>
+            <a:r>
+              <a:rPr lang="en-IN" dirty="0">
+                <a:solidFill>
+                  <a:srgbClr val="000000"/>
+                </a:solidFill>
+                <a:latin typeface="Constantia"/>
+                <a:ea typeface="Constantia"/>
+                <a:cs typeface="Constantia"/>
+                <a:sym typeface="Constantia"/>
+              </a:rPr>
+              <a:t>Raise Tickets</a:t>
+            </a:r>
+            <a:endParaRPr kumimoji="0" lang="en-IN" sz="1800" b="0" i="0" u="none" strike="noStrike" cap="none" spc="0" normalizeH="0" baseline="0" dirty="0">
+              <a:ln>
+                <a:noFill/>
+              </a:ln>
+              <a:solidFill>
+                <a:srgbClr val="000000"/>
+              </a:solidFill>
+              <a:effectLst/>
+              <a:uFillTx/>
+              <a:latin typeface="Constantia"/>
+              <a:ea typeface="Constantia"/>
+              <a:cs typeface="Constantia"/>
+              <a:sym typeface="Constantia"/>
+            </a:endParaRPr>
+          </a:p>
+        </p:txBody>
+      </p:sp>
+      <p:sp>
+        <p:nvSpPr>
+          <p:cNvPr id="7" name="Frame 6">
+            <a:extLst>
+              <a:ext uri="{FF2B5EF4-FFF2-40B4-BE49-F238E27FC236}">
+                <a16:creationId xmlns:a16="http://schemas.microsoft.com/office/drawing/2014/main" id="{DA8D5A8C-DE7E-48C8-9BED-1C44341522AB}"/>
+              </a:ext>
+            </a:extLst>
+          </p:cNvPr>
+          <p:cNvSpPr/>
+          <p:nvPr/>
+        </p:nvSpPr>
+        <p:spPr>
+          <a:xfrm>
+            <a:off x="5742116" y="1946060"/>
+            <a:ext cx="2718316" cy="1008112"/>
+          </a:xfrm>
+          <a:prstGeom prst="frame">
+            <a:avLst/>
+          </a:prstGeom>
+          <a:solidFill>
+            <a:srgbClr val="FFFFFF"/>
+          </a:solidFill>
+          <a:ln w="25400" cap="flat">
+            <a:solidFill>
+              <a:schemeClr val="accent1"/>
+            </a:solidFill>
+            <a:prstDash val="solid"/>
+            <a:round/>
+          </a:ln>
+          <a:effectLst>
+            <a:outerShdw blurRad="63500" dist="38100" dir="5400000" rotWithShape="0">
+              <a:srgbClr val="032544">
+                <a:alpha val="48000"/>
+              </a:srgbClr>
+            </a:outerShdw>
+          </a:effectLst>
+          <a:sp3d/>
+        </p:spPr>
+        <p:style>
+          <a:lnRef idx="0">
+            <a:scrgbClr r="0" g="0" b="0"/>
+          </a:lnRef>
+          <a:fillRef idx="0">
+            <a:scrgbClr r="0" g="0" b="0"/>
+          </a:fillRef>
+          <a:effectRef idx="0">
+            <a:scrgbClr r="0" g="0" b="0"/>
+          </a:effectRef>
+          <a:fontRef idx="none"/>
+        </p:style>
+        <p:txBody>
+          <a:bodyPr rot="0" spcFirstLastPara="1" vertOverflow="overflow" horzOverflow="overflow" vert="horz" wrap="square" lIns="45719" tIns="45719" rIns="45719" bIns="45719" numCol="1" spcCol="38100" rtlCol="0" anchor="ctr">
+            <a:spAutoFit/>
+          </a:bodyPr>
+          <a:lstStyle/>
+          <a:p>
+            <a:pPr marL="0" marR="0" indent="0" algn="l" defTabSz="914400" rtl="0" fontAlgn="auto" latinLnBrk="0" hangingPunct="0">
+              <a:lnSpc>
+                <a:spcPct val="100000"/>
+              </a:lnSpc>
+              <a:spcBef>
+                <a:spcPts val="0"/>
+              </a:spcBef>
+              <a:spcAft>
+                <a:spcPts val="0"/>
+              </a:spcAft>
+              <a:buClrTx/>
+              <a:buSzTx/>
+              <a:buFontTx/>
+              <a:buNone/>
+              <a:tabLst/>
+            </a:pPr>
+            <a:endParaRPr kumimoji="0" lang="en-IN" sz="1800" b="0" i="0" u="none" strike="noStrike" cap="none" spc="0" normalizeH="0" baseline="0" dirty="0">
+              <a:ln>
+                <a:noFill/>
+              </a:ln>
+              <a:solidFill>
+                <a:srgbClr val="000000"/>
+              </a:solidFill>
+              <a:effectLst/>
+              <a:uFillTx/>
+              <a:latin typeface="Constantia"/>
+              <a:ea typeface="Constantia"/>
+              <a:cs typeface="Constantia"/>
+              <a:sym typeface="Constantia"/>
+            </a:endParaRPr>
+          </a:p>
+        </p:txBody>
+      </p:sp>
+      <p:sp>
+        <p:nvSpPr>
+          <p:cNvPr id="8" name="TextBox 7">
+            <a:extLst>
+              <a:ext uri="{FF2B5EF4-FFF2-40B4-BE49-F238E27FC236}">
+                <a16:creationId xmlns:a16="http://schemas.microsoft.com/office/drawing/2014/main" id="{9B4F2905-5123-43F1-8D36-99C15F893979}"/>
+              </a:ext>
+            </a:extLst>
+          </p:cNvPr>
+          <p:cNvSpPr txBox="1"/>
+          <p:nvPr/>
+        </p:nvSpPr>
+        <p:spPr>
+          <a:xfrm>
+            <a:off x="6150213" y="2217422"/>
+            <a:ext cx="1902122" cy="646329"/>
+          </a:xfrm>
+          <a:prstGeom prst="rect">
+            <a:avLst/>
+          </a:prstGeom>
+          <a:noFill/>
+          <a:ln w="12700" cap="flat">
+            <a:noFill/>
+            <a:miter lim="400000"/>
+          </a:ln>
+          <a:effectLst/>
+          <a:sp3d/>
+        </p:spPr>
+        <p:style>
+          <a:lnRef idx="0">
+            <a:scrgbClr r="0" g="0" b="0"/>
+          </a:lnRef>
+          <a:fillRef idx="0">
+            <a:scrgbClr r="0" g="0" b="0"/>
+          </a:fillRef>
+          <a:effectRef idx="0">
+            <a:scrgbClr r="0" g="0" b="0"/>
+          </a:effectRef>
+          <a:fontRef idx="none"/>
+        </p:style>
+        <p:txBody>
+          <a:bodyPr rot="0" spcFirstLastPara="1" vertOverflow="overflow" horzOverflow="overflow" vert="horz" wrap="none" lIns="45719" tIns="45719" rIns="45719" bIns="45719" numCol="1" spcCol="38100" rtlCol="0" anchor="t">
+            <a:spAutoFit/>
+          </a:bodyPr>
+          <a:lstStyle/>
+          <a:p>
+            <a:pPr marL="0" marR="0" indent="0" algn="l" defTabSz="914400" rtl="0" fontAlgn="auto" latinLnBrk="0" hangingPunct="0">
+              <a:lnSpc>
+                <a:spcPct val="100000"/>
+              </a:lnSpc>
+              <a:spcBef>
+                <a:spcPts val="0"/>
+              </a:spcBef>
+              <a:spcAft>
+                <a:spcPts val="0"/>
+              </a:spcAft>
+              <a:buClrTx/>
+              <a:buSzTx/>
+              <a:buFontTx/>
+              <a:buNone/>
+              <a:tabLst/>
+            </a:pPr>
+            <a:r>
+              <a:rPr lang="en-IN" dirty="0"/>
+              <a:t>Notification to </a:t>
+            </a:r>
+          </a:p>
+          <a:p>
+            <a:pPr marL="0" marR="0" indent="0" algn="l" defTabSz="914400" rtl="0" fontAlgn="auto" latinLnBrk="0" hangingPunct="0">
+              <a:lnSpc>
+                <a:spcPct val="100000"/>
+              </a:lnSpc>
+              <a:spcBef>
+                <a:spcPts val="0"/>
+              </a:spcBef>
+              <a:spcAft>
+                <a:spcPts val="0"/>
+              </a:spcAft>
+              <a:buClrTx/>
+              <a:buSzTx/>
+              <a:buFontTx/>
+              <a:buNone/>
+              <a:tabLst/>
+            </a:pPr>
+            <a:r>
+              <a:rPr lang="en-IN" dirty="0"/>
+              <a:t>authorised person</a:t>
+            </a:r>
+            <a:endParaRPr kumimoji="0" lang="en-IN" sz="1800" b="0" i="0" u="none" strike="noStrike" cap="none" spc="0" normalizeH="0" baseline="0" dirty="0">
+              <a:ln>
+                <a:noFill/>
+              </a:ln>
+              <a:solidFill>
+                <a:srgbClr val="000000"/>
+              </a:solidFill>
+              <a:effectLst/>
+              <a:uFillTx/>
+              <a:latin typeface="Constantia"/>
+              <a:ea typeface="Constantia"/>
+              <a:cs typeface="Constantia"/>
+              <a:sym typeface="Constantia"/>
+            </a:endParaRPr>
+          </a:p>
+        </p:txBody>
+      </p:sp>
+      <p:cxnSp>
+        <p:nvCxnSpPr>
+          <p:cNvPr id="9" name="Straight Arrow Connector 8">
+            <a:extLst>
+              <a:ext uri="{FF2B5EF4-FFF2-40B4-BE49-F238E27FC236}">
+                <a16:creationId xmlns:a16="http://schemas.microsoft.com/office/drawing/2014/main" id="{7BD4BBBD-8479-4C08-9E17-C9EFE4699349}"/>
+              </a:ext>
+            </a:extLst>
+          </p:cNvPr>
+          <p:cNvCxnSpPr>
+            <a:endCxn id="6" idx="2"/>
+          </p:cNvCxnSpPr>
+          <p:nvPr/>
+        </p:nvCxnSpPr>
+        <p:spPr>
+          <a:xfrm>
+            <a:off x="1918754" y="2450116"/>
+            <a:ext cx="1155597" cy="1"/>
+          </a:xfrm>
+          <a:prstGeom prst="straightConnector1">
+            <a:avLst/>
+          </a:prstGeom>
+          <a:noFill/>
+          <a:ln w="25400" cap="flat">
+            <a:solidFill>
+              <a:schemeClr val="accent1"/>
+            </a:solidFill>
+            <a:prstDash val="solid"/>
+            <a:round/>
+            <a:tailEnd type="triangle"/>
+          </a:ln>
+          <a:effectLst>
+            <a:outerShdw blurRad="63500" dist="38100" dir="5400000" rotWithShape="0">
+              <a:srgbClr val="032544">
+                <a:alpha val="48000"/>
+              </a:srgbClr>
+            </a:outerShdw>
+          </a:effectLst>
+          <a:sp3d/>
+        </p:spPr>
+        <p:style>
+          <a:lnRef idx="0">
+            <a:scrgbClr r="0" g="0" b="0"/>
+          </a:lnRef>
+          <a:fillRef idx="0">
+            <a:scrgbClr r="0" g="0" b="0"/>
+          </a:fillRef>
+          <a:effectRef idx="0">
+            <a:scrgbClr r="0" g="0" b="0"/>
+          </a:effectRef>
+          <a:fontRef idx="none"/>
+        </p:style>
+      </p:cxnSp>
+      <p:cxnSp>
+        <p:nvCxnSpPr>
+          <p:cNvPr id="10" name="Straight Arrow Connector 9">
+            <a:extLst>
+              <a:ext uri="{FF2B5EF4-FFF2-40B4-BE49-F238E27FC236}">
+                <a16:creationId xmlns:a16="http://schemas.microsoft.com/office/drawing/2014/main" id="{D0D6361A-53C2-4820-A7BB-8CF6073E78D6}"/>
+              </a:ext>
+            </a:extLst>
+          </p:cNvPr>
+          <p:cNvCxnSpPr>
+            <a:stCxn id="6" idx="6"/>
+            <a:endCxn id="7" idx="1"/>
+          </p:cNvCxnSpPr>
+          <p:nvPr/>
+        </p:nvCxnSpPr>
+        <p:spPr>
+          <a:xfrm flipV="1">
+            <a:off x="4586519" y="2450116"/>
+            <a:ext cx="1155597" cy="1"/>
+          </a:xfrm>
+          <a:prstGeom prst="straightConnector1">
+            <a:avLst/>
+          </a:prstGeom>
+          <a:noFill/>
+          <a:ln w="25400" cap="flat">
+            <a:solidFill>
+              <a:schemeClr val="accent1"/>
+            </a:solidFill>
+            <a:prstDash val="solid"/>
+            <a:round/>
+            <a:tailEnd type="triangle"/>
+          </a:ln>
+          <a:effectLst>
+            <a:outerShdw blurRad="63500" dist="38100" dir="5400000" rotWithShape="0">
+              <a:srgbClr val="032544">
+                <a:alpha val="48000"/>
+              </a:srgbClr>
+            </a:outerShdw>
+          </a:effectLst>
+          <a:sp3d/>
+        </p:spPr>
+        <p:style>
+          <a:lnRef idx="0">
+            <a:scrgbClr r="0" g="0" b="0"/>
+          </a:lnRef>
+          <a:fillRef idx="0">
+            <a:scrgbClr r="0" g="0" b="0"/>
+          </a:fillRef>
+          <a:effectRef idx="0">
+            <a:scrgbClr r="0" g="0" b="0"/>
+          </a:effectRef>
+          <a:fontRef idx="none"/>
+        </p:style>
+      </p:cxnSp>
+      <p:cxnSp>
+        <p:nvCxnSpPr>
+          <p:cNvPr id="11" name="Straight Connector 10">
+            <a:extLst>
+              <a:ext uri="{FF2B5EF4-FFF2-40B4-BE49-F238E27FC236}">
+                <a16:creationId xmlns:a16="http://schemas.microsoft.com/office/drawing/2014/main" id="{E09A28BB-C2AE-4DEE-A8E4-3F57A33C4261}"/>
+              </a:ext>
+            </a:extLst>
+          </p:cNvPr>
+          <p:cNvCxnSpPr/>
+          <p:nvPr/>
+        </p:nvCxnSpPr>
+        <p:spPr>
+          <a:xfrm>
+            <a:off x="2987824" y="4227934"/>
+            <a:ext cx="0" cy="576064"/>
+          </a:xfrm>
+          <a:prstGeom prst="line">
+            <a:avLst/>
+          </a:prstGeom>
+          <a:noFill/>
+          <a:ln w="25400" cap="flat">
+            <a:solidFill>
+              <a:schemeClr val="accent1"/>
+            </a:solidFill>
+            <a:prstDash val="solid"/>
+            <a:round/>
+          </a:ln>
+          <a:effectLst>
+            <a:outerShdw blurRad="63500" dist="38100" dir="5400000" rotWithShape="0">
+              <a:srgbClr val="032544">
+                <a:alpha val="48000"/>
+              </a:srgbClr>
+            </a:outerShdw>
+          </a:effectLst>
+          <a:sp3d/>
+        </p:spPr>
+        <p:style>
+          <a:lnRef idx="0">
+            <a:scrgbClr r="0" g="0" b="0"/>
+          </a:lnRef>
+          <a:fillRef idx="0">
+            <a:scrgbClr r="0" g="0" b="0"/>
+          </a:fillRef>
+          <a:effectRef idx="0">
+            <a:scrgbClr r="0" g="0" b="0"/>
+          </a:effectRef>
+          <a:fontRef idx="none"/>
+        </p:style>
+      </p:cxnSp>
+      <p:cxnSp>
+        <p:nvCxnSpPr>
+          <p:cNvPr id="12" name="Straight Connector 11">
+            <a:extLst>
+              <a:ext uri="{FF2B5EF4-FFF2-40B4-BE49-F238E27FC236}">
+                <a16:creationId xmlns:a16="http://schemas.microsoft.com/office/drawing/2014/main" id="{38ED5334-CB21-4560-8570-D27251454850}"/>
+              </a:ext>
+            </a:extLst>
+          </p:cNvPr>
+          <p:cNvCxnSpPr>
+            <a:cxnSpLocks/>
+          </p:cNvCxnSpPr>
+          <p:nvPr/>
+        </p:nvCxnSpPr>
+        <p:spPr>
+          <a:xfrm>
+            <a:off x="2987824" y="4227934"/>
+            <a:ext cx="2193776" cy="0"/>
+          </a:xfrm>
+          <a:prstGeom prst="line">
+            <a:avLst/>
+          </a:prstGeom>
+          <a:noFill/>
+          <a:ln w="25400" cap="flat">
+            <a:solidFill>
+              <a:schemeClr val="accent1"/>
+            </a:solidFill>
+            <a:prstDash val="solid"/>
+            <a:round/>
+          </a:ln>
+          <a:effectLst>
+            <a:outerShdw blurRad="63500" dist="38100" dir="5400000" rotWithShape="0">
+              <a:srgbClr val="032544">
+                <a:alpha val="48000"/>
+              </a:srgbClr>
+            </a:outerShdw>
+          </a:effectLst>
+          <a:sp3d/>
+        </p:spPr>
+        <p:style>
+          <a:lnRef idx="0">
+            <a:scrgbClr r="0" g="0" b="0"/>
+          </a:lnRef>
+          <a:fillRef idx="0">
+            <a:scrgbClr r="0" g="0" b="0"/>
+          </a:fillRef>
+          <a:effectRef idx="0">
+            <a:scrgbClr r="0" g="0" b="0"/>
+          </a:effectRef>
+          <a:fontRef idx="none"/>
+        </p:style>
+      </p:cxnSp>
+      <p:cxnSp>
+        <p:nvCxnSpPr>
+          <p:cNvPr id="13" name="Straight Connector 12">
+            <a:extLst>
+              <a:ext uri="{FF2B5EF4-FFF2-40B4-BE49-F238E27FC236}">
+                <a16:creationId xmlns:a16="http://schemas.microsoft.com/office/drawing/2014/main" id="{2B272F0D-D553-4AC0-AA85-F9F1622EA84D}"/>
+              </a:ext>
+            </a:extLst>
+          </p:cNvPr>
+          <p:cNvCxnSpPr>
+            <a:cxnSpLocks/>
+          </p:cNvCxnSpPr>
+          <p:nvPr/>
+        </p:nvCxnSpPr>
+        <p:spPr>
+          <a:xfrm>
+            <a:off x="2987824" y="4803998"/>
+            <a:ext cx="2193776" cy="0"/>
+          </a:xfrm>
+          <a:prstGeom prst="line">
+            <a:avLst/>
+          </a:prstGeom>
+          <a:noFill/>
+          <a:ln w="25400" cap="flat">
+            <a:solidFill>
+              <a:schemeClr val="accent1"/>
+            </a:solidFill>
+            <a:prstDash val="solid"/>
+            <a:round/>
+          </a:ln>
+          <a:effectLst>
+            <a:outerShdw blurRad="63500" dist="38100" dir="5400000" rotWithShape="0">
+              <a:srgbClr val="032544">
+                <a:alpha val="48000"/>
+              </a:srgbClr>
+            </a:outerShdw>
+          </a:effectLst>
+          <a:sp3d/>
+        </p:spPr>
+        <p:style>
+          <a:lnRef idx="0">
+            <a:scrgbClr r="0" g="0" b="0"/>
+          </a:lnRef>
+          <a:fillRef idx="0">
+            <a:scrgbClr r="0" g="0" b="0"/>
+          </a:fillRef>
+          <a:effectRef idx="0">
+            <a:scrgbClr r="0" g="0" b="0"/>
+          </a:effectRef>
+          <a:fontRef idx="none"/>
+        </p:style>
+      </p:cxnSp>
+      <p:sp>
+        <p:nvSpPr>
+          <p:cNvPr id="14" name="TextBox 13">
+            <a:extLst>
+              <a:ext uri="{FF2B5EF4-FFF2-40B4-BE49-F238E27FC236}">
+                <a16:creationId xmlns:a16="http://schemas.microsoft.com/office/drawing/2014/main" id="{BC82F786-D26F-4E9D-BB91-99BA0AECD405}"/>
+              </a:ext>
+            </a:extLst>
+          </p:cNvPr>
+          <p:cNvSpPr txBox="1"/>
+          <p:nvPr/>
+        </p:nvSpPr>
+        <p:spPr>
+          <a:xfrm>
+            <a:off x="3275856" y="4371950"/>
+            <a:ext cx="1944313" cy="369330"/>
+          </a:xfrm>
+          <a:prstGeom prst="rect">
+            <a:avLst/>
+          </a:prstGeom>
+          <a:noFill/>
+          <a:ln w="12700" cap="flat">
+            <a:noFill/>
+            <a:miter lim="400000"/>
+          </a:ln>
+          <a:effectLst/>
+          <a:sp3d/>
+        </p:spPr>
+        <p:style>
+          <a:lnRef idx="0">
+            <a:scrgbClr r="0" g="0" b="0"/>
+          </a:lnRef>
+          <a:fillRef idx="0">
+            <a:scrgbClr r="0" g="0" b="0"/>
+          </a:fillRef>
+          <a:effectRef idx="0">
+            <a:scrgbClr r="0" g="0" b="0"/>
+          </a:effectRef>
+          <a:fontRef idx="none"/>
+        </p:style>
+        <p:txBody>
+          <a:bodyPr rot="0" spcFirstLastPara="1" vertOverflow="overflow" horzOverflow="overflow" vert="horz" wrap="none" lIns="45719" tIns="45719" rIns="45719" bIns="45719" numCol="1" spcCol="38100" rtlCol="0" anchor="t">
+            <a:spAutoFit/>
+          </a:bodyPr>
+          <a:lstStyle/>
+          <a:p>
+            <a:pPr marL="0" marR="0" indent="0" algn="l" defTabSz="914400" rtl="0" fontAlgn="auto" latinLnBrk="0" hangingPunct="0">
+              <a:lnSpc>
+                <a:spcPct val="100000"/>
+              </a:lnSpc>
+              <a:spcBef>
+                <a:spcPts val="0"/>
+              </a:spcBef>
+              <a:spcAft>
+                <a:spcPts val="0"/>
+              </a:spcAft>
+              <a:buClrTx/>
+              <a:buSzTx/>
+              <a:buFontTx/>
+              <a:buNone/>
+              <a:tabLst/>
+            </a:pPr>
+            <a:r>
+              <a:rPr kumimoji="0" lang="en-IN" sz="1800" b="0" i="0" u="none" strike="noStrike" cap="none" spc="0" normalizeH="0" baseline="0" dirty="0">
+                <a:ln>
+                  <a:noFill/>
+                </a:ln>
+                <a:solidFill>
+                  <a:srgbClr val="000000"/>
+                </a:solidFill>
+                <a:effectLst/>
+                <a:uFillTx/>
+                <a:latin typeface="Constantia"/>
+                <a:ea typeface="Constantia"/>
+                <a:cs typeface="Constantia"/>
+                <a:sym typeface="Constantia"/>
+              </a:rPr>
+              <a:t>Keyword Database</a:t>
+            </a:r>
+          </a:p>
+        </p:txBody>
+      </p:sp>
+      <p:cxnSp>
+        <p:nvCxnSpPr>
+          <p:cNvPr id="15" name="Straight Arrow Connector 14">
+            <a:extLst>
+              <a:ext uri="{FF2B5EF4-FFF2-40B4-BE49-F238E27FC236}">
+                <a16:creationId xmlns:a16="http://schemas.microsoft.com/office/drawing/2014/main" id="{200984AF-C21C-4593-B087-1EEAC6F78692}"/>
+              </a:ext>
+            </a:extLst>
+          </p:cNvPr>
+          <p:cNvCxnSpPr/>
+          <p:nvPr/>
+        </p:nvCxnSpPr>
+        <p:spPr>
+          <a:xfrm>
+            <a:off x="1378694" y="2954172"/>
+            <a:ext cx="1609130" cy="1602443"/>
+          </a:xfrm>
+          <a:prstGeom prst="straightConnector1">
+            <a:avLst/>
+          </a:prstGeom>
+          <a:noFill/>
+          <a:ln w="25400" cap="flat">
+            <a:solidFill>
+              <a:schemeClr val="accent1"/>
+            </a:solidFill>
+            <a:prstDash val="solid"/>
+            <a:round/>
+            <a:tailEnd type="triangle"/>
+          </a:ln>
+          <a:effectLst>
+            <a:outerShdw blurRad="63500" dist="38100" dir="5400000" rotWithShape="0">
+              <a:srgbClr val="032544">
+                <a:alpha val="48000"/>
+              </a:srgbClr>
+            </a:outerShdw>
+          </a:effectLst>
+          <a:sp3d/>
+        </p:spPr>
+        <p:style>
+          <a:lnRef idx="0">
+            <a:scrgbClr r="0" g="0" b="0"/>
+          </a:lnRef>
+          <a:fillRef idx="0">
+            <a:scrgbClr r="0" g="0" b="0"/>
+          </a:fillRef>
+          <a:effectRef idx="0">
+            <a:scrgbClr r="0" g="0" b="0"/>
+          </a:effectRef>
+          <a:fontRef idx="none"/>
+        </p:style>
+      </p:cxnSp>
+      <p:cxnSp>
+        <p:nvCxnSpPr>
+          <p:cNvPr id="16" name="Straight Arrow Connector 15">
+            <a:extLst>
+              <a:ext uri="{FF2B5EF4-FFF2-40B4-BE49-F238E27FC236}">
+                <a16:creationId xmlns:a16="http://schemas.microsoft.com/office/drawing/2014/main" id="{DD29FB4D-BFC6-4F44-BB95-EAD3733DD8F8}"/>
+              </a:ext>
+            </a:extLst>
+          </p:cNvPr>
+          <p:cNvCxnSpPr>
+            <a:endCxn id="6" idx="4"/>
+          </p:cNvCxnSpPr>
+          <p:nvPr/>
+        </p:nvCxnSpPr>
+        <p:spPr>
+          <a:xfrm flipV="1">
+            <a:off x="3830435" y="2904547"/>
+            <a:ext cx="0" cy="1323389"/>
+          </a:xfrm>
+          <a:prstGeom prst="straightConnector1">
+            <a:avLst/>
+          </a:prstGeom>
+          <a:noFill/>
+          <a:ln w="25400" cap="flat">
+            <a:solidFill>
+              <a:schemeClr val="accent1"/>
+            </a:solidFill>
+            <a:prstDash val="solid"/>
+            <a:round/>
+            <a:tailEnd type="triangle"/>
+          </a:ln>
+          <a:effectLst>
+            <a:outerShdw blurRad="63500" dist="38100" dir="5400000" rotWithShape="0">
+              <a:srgbClr val="032544">
+                <a:alpha val="48000"/>
+              </a:srgbClr>
+            </a:outerShdw>
+          </a:effectLst>
+          <a:sp3d/>
+        </p:spPr>
+        <p:style>
+          <a:lnRef idx="0">
+            <a:scrgbClr r="0" g="0" b="0"/>
+          </a:lnRef>
+          <a:fillRef idx="0">
+            <a:scrgbClr r="0" g="0" b="0"/>
+          </a:fillRef>
+          <a:effectRef idx="0">
+            <a:scrgbClr r="0" g="0" b="0"/>
+          </a:effectRef>
+          <a:fontRef idx="none"/>
+        </p:style>
+      </p:cxnSp>
+      <p:sp>
+        <p:nvSpPr>
+          <p:cNvPr id="17" name="Frame 16">
+            <a:extLst>
+              <a:ext uri="{FF2B5EF4-FFF2-40B4-BE49-F238E27FC236}">
+                <a16:creationId xmlns:a16="http://schemas.microsoft.com/office/drawing/2014/main" id="{7CDE5C7C-F863-4E77-915A-559F3A29680C}"/>
+              </a:ext>
+            </a:extLst>
+          </p:cNvPr>
+          <p:cNvSpPr/>
+          <p:nvPr/>
+        </p:nvSpPr>
+        <p:spPr>
+          <a:xfrm>
+            <a:off x="838634" y="1946060"/>
+            <a:ext cx="1080120" cy="1008112"/>
           </a:xfrm>
           <a:prstGeom prst="frame">
             <a:avLst/>
@@ -4800,6 +5643,209 @@
       </p:sp>
       <p:sp>
         <p:nvSpPr>
+          <p:cNvPr id="18" name="TextBox 17">
+            <a:extLst>
+              <a:ext uri="{FF2B5EF4-FFF2-40B4-BE49-F238E27FC236}">
+                <a16:creationId xmlns:a16="http://schemas.microsoft.com/office/drawing/2014/main" id="{4894E485-08DC-494C-B0C7-B00ADA0BBF31}"/>
+              </a:ext>
+            </a:extLst>
+          </p:cNvPr>
+          <p:cNvSpPr txBox="1"/>
+          <p:nvPr/>
+        </p:nvSpPr>
+        <p:spPr>
+          <a:xfrm>
+            <a:off x="1007604" y="2355921"/>
+            <a:ext cx="720080" cy="369330"/>
+          </a:xfrm>
+          <a:prstGeom prst="rect">
+            <a:avLst/>
+          </a:prstGeom>
+          <a:noFill/>
+          <a:ln w="12700" cap="flat">
+            <a:noFill/>
+            <a:miter lim="400000"/>
+          </a:ln>
+          <a:effectLst/>
+          <a:sp3d/>
+        </p:spPr>
+        <p:style>
+          <a:lnRef idx="0">
+            <a:scrgbClr r="0" g="0" b="0"/>
+          </a:lnRef>
+          <a:fillRef idx="0">
+            <a:scrgbClr r="0" g="0" b="0"/>
+          </a:fillRef>
+          <a:effectRef idx="0">
+            <a:scrgbClr r="0" g="0" b="0"/>
+          </a:effectRef>
+          <a:fontRef idx="none"/>
+        </p:style>
+        <p:txBody>
+          <a:bodyPr rot="0" spcFirstLastPara="1" vertOverflow="overflow" horzOverflow="overflow" vert="horz" wrap="square" lIns="45719" tIns="45719" rIns="45719" bIns="45719" numCol="1" spcCol="38100" rtlCol="0" anchor="t">
+            <a:spAutoFit/>
+          </a:bodyPr>
+          <a:lstStyle/>
+          <a:p>
+            <a:pPr marL="0" marR="0" indent="0" algn="l" defTabSz="914400" rtl="0" fontAlgn="auto" latinLnBrk="0" hangingPunct="0">
+              <a:lnSpc>
+                <a:spcPct val="100000"/>
+              </a:lnSpc>
+              <a:spcBef>
+                <a:spcPts val="0"/>
+              </a:spcBef>
+              <a:spcAft>
+                <a:spcPts val="0"/>
+              </a:spcAft>
+              <a:buClrTx/>
+              <a:buSzTx/>
+              <a:buFontTx/>
+              <a:buNone/>
+              <a:tabLst/>
+            </a:pPr>
+            <a:r>
+              <a:rPr lang="en-IN" dirty="0"/>
+              <a:t>User</a:t>
+            </a:r>
+            <a:endParaRPr kumimoji="0" lang="en-IN" sz="1800" b="0" i="0" u="none" strike="noStrike" cap="none" spc="0" normalizeH="0" baseline="0" dirty="0">
+              <a:ln>
+                <a:noFill/>
+              </a:ln>
+              <a:solidFill>
+                <a:srgbClr val="000000"/>
+              </a:solidFill>
+              <a:effectLst/>
+              <a:uFillTx/>
+              <a:latin typeface="Constantia"/>
+              <a:ea typeface="Constantia"/>
+              <a:cs typeface="Constantia"/>
+              <a:sym typeface="Constantia"/>
+            </a:endParaRPr>
+          </a:p>
+        </p:txBody>
+      </p:sp>
+    </p:spTree>
+    <p:extLst>
+      <p:ext uri="{BB962C8B-B14F-4D97-AF65-F5344CB8AC3E}">
+        <p14:creationId xmlns:p14="http://schemas.microsoft.com/office/powerpoint/2010/main" val="719056927"/>
+      </p:ext>
+    </p:extLst>
+  </p:cSld>
+  <p:clrMapOvr>
+    <a:masterClrMapping/>
+  </p:clrMapOvr>
+</p:sld>
+</file>
+
+<file path=ppt/slides/slide11.xml><?xml version="1.0" encoding="utf-8"?>
+<p:sld xmlns:a="http://schemas.openxmlformats.org/drawingml/2006/main" xmlns:r="http://schemas.openxmlformats.org/officeDocument/2006/relationships" xmlns:p="http://schemas.openxmlformats.org/presentationml/2006/main">
+  <p:cSld>
+    <p:spTree>
+      <p:nvGrpSpPr>
+        <p:cNvPr id="1" name=""/>
+        <p:cNvGrpSpPr/>
+        <p:nvPr/>
+      </p:nvGrpSpPr>
+      <p:grpSpPr>
+        <a:xfrm>
+          <a:off x="0" y="0"/>
+          <a:ext cx="0" cy="0"/>
+          <a:chOff x="0" y="0"/>
+          <a:chExt cx="0" cy="0"/>
+        </a:xfrm>
+      </p:grpSpPr>
+      <p:sp>
+        <p:nvSpPr>
+          <p:cNvPr id="27" name="Frame 26">
+            <a:extLst>
+              <a:ext uri="{FF2B5EF4-FFF2-40B4-BE49-F238E27FC236}">
+                <a16:creationId xmlns:a16="http://schemas.microsoft.com/office/drawing/2014/main" id="{D2F9FAF2-8357-4698-A3DD-30FB4A421171}"/>
+              </a:ext>
+            </a:extLst>
+          </p:cNvPr>
+          <p:cNvSpPr/>
+          <p:nvPr/>
+        </p:nvSpPr>
+        <p:spPr>
+          <a:xfrm>
+            <a:off x="185416" y="2552089"/>
+            <a:ext cx="1008112" cy="720080"/>
+          </a:xfrm>
+          <a:prstGeom prst="frame">
+            <a:avLst/>
+          </a:prstGeom>
+          <a:solidFill>
+            <a:srgbClr val="FFFFFF"/>
+          </a:solidFill>
+          <a:ln w="25400" cap="flat">
+            <a:solidFill>
+              <a:schemeClr val="accent1"/>
+            </a:solidFill>
+            <a:prstDash val="solid"/>
+            <a:round/>
+          </a:ln>
+          <a:effectLst>
+            <a:outerShdw blurRad="63500" dist="38100" dir="5400000" rotWithShape="0">
+              <a:srgbClr val="032544">
+                <a:alpha val="48000"/>
+              </a:srgbClr>
+            </a:outerShdw>
+          </a:effectLst>
+          <a:sp3d/>
+        </p:spPr>
+        <p:style>
+          <a:lnRef idx="0">
+            <a:scrgbClr r="0" g="0" b="0"/>
+          </a:lnRef>
+          <a:fillRef idx="0">
+            <a:scrgbClr r="0" g="0" b="0"/>
+          </a:fillRef>
+          <a:effectRef idx="0">
+            <a:scrgbClr r="0" g="0" b="0"/>
+          </a:effectRef>
+          <a:fontRef idx="none"/>
+        </p:style>
+        <p:txBody>
+          <a:bodyPr rot="0" spcFirstLastPara="1" vertOverflow="overflow" horzOverflow="overflow" vert="horz" wrap="square" lIns="45719" tIns="45719" rIns="45719" bIns="45719" numCol="1" spcCol="38100" rtlCol="0" anchor="ctr">
+            <a:spAutoFit/>
+          </a:bodyPr>
+          <a:lstStyle/>
+          <a:p>
+            <a:pPr marL="0" marR="0" indent="0" algn="l" defTabSz="914400" rtl="0" fontAlgn="auto" latinLnBrk="0" hangingPunct="0">
+              <a:lnSpc>
+                <a:spcPct val="100000"/>
+              </a:lnSpc>
+              <a:spcBef>
+                <a:spcPts val="0"/>
+              </a:spcBef>
+              <a:spcAft>
+                <a:spcPts val="0"/>
+              </a:spcAft>
+              <a:buClrTx/>
+              <a:buSzTx/>
+              <a:buFontTx/>
+              <a:buNone/>
+              <a:tabLst/>
+            </a:pPr>
+            <a:endParaRPr kumimoji="0" lang="en-IN" sz="1800" b="0" i="0" u="none" strike="noStrike" cap="none" spc="0" normalizeH="0" baseline="0">
+              <a:ln>
+                <a:noFill/>
+              </a:ln>
+              <a:solidFill>
+                <a:srgbClr val="000000"/>
+              </a:solidFill>
+              <a:effectLst/>
+              <a:uFillTx/>
+              <a:latin typeface="Constantia"/>
+              <a:ea typeface="Constantia"/>
+              <a:cs typeface="Constantia"/>
+              <a:sym typeface="Constantia"/>
+            </a:endParaRPr>
+          </a:p>
+        </p:txBody>
+      </p:sp>
+      <p:sp>
+        <p:nvSpPr>
           <p:cNvPr id="28" name="Oval 27">
             <a:extLst>
               <a:ext uri="{FF2B5EF4-FFF2-40B4-BE49-F238E27FC236}">
@@ -6048,7 +7094,7 @@
 </p:sld>
 </file>
 
-<file path=ppt/slides/slide11.xml><?xml version="1.0" encoding="utf-8"?>
+<file path=ppt/slides/slide12.xml><?xml version="1.0" encoding="utf-8"?>
 <p:sld xmlns:a="http://schemas.openxmlformats.org/drawingml/2006/main" xmlns:r="http://schemas.openxmlformats.org/officeDocument/2006/relationships" xmlns:p="http://schemas.openxmlformats.org/presentationml/2006/main">
   <p:cSld>
     <p:spTree>
@@ -6177,99 +7223,6 @@
     <p:extLst>
       <p:ext uri="{BB962C8B-B14F-4D97-AF65-F5344CB8AC3E}">
         <p14:creationId xmlns:p14="http://schemas.microsoft.com/office/powerpoint/2010/main" val="2149853291"/>
-      </p:ext>
-    </p:extLst>
-  </p:cSld>
-  <p:clrMapOvr>
-    <a:masterClrMapping/>
-  </p:clrMapOvr>
-</p:sld>
-</file>
-
-<file path=ppt/slides/slide12.xml><?xml version="1.0" encoding="utf-8"?>
-<p:sld xmlns:a="http://schemas.openxmlformats.org/drawingml/2006/main" xmlns:r="http://schemas.openxmlformats.org/officeDocument/2006/relationships" xmlns:p="http://schemas.openxmlformats.org/presentationml/2006/main">
-  <p:cSld>
-    <p:spTree>
-      <p:nvGrpSpPr>
-        <p:cNvPr id="1" name=""/>
-        <p:cNvGrpSpPr/>
-        <p:nvPr/>
-      </p:nvGrpSpPr>
-      <p:grpSpPr>
-        <a:xfrm>
-          <a:off x="0" y="0"/>
-          <a:ext cx="0" cy="0"/>
-          <a:chOff x="0" y="0"/>
-          <a:chExt cx="0" cy="0"/>
-        </a:xfrm>
-      </p:grpSpPr>
-      <p:sp>
-        <p:nvSpPr>
-          <p:cNvPr id="2" name="Title 1">
-            <a:extLst>
-              <a:ext uri="{FF2B5EF4-FFF2-40B4-BE49-F238E27FC236}">
-                <a16:creationId xmlns:a16="http://schemas.microsoft.com/office/drawing/2014/main" id="{B417B757-8386-414F-986A-2A206620C5F5}"/>
-              </a:ext>
-            </a:extLst>
-          </p:cNvPr>
-          <p:cNvSpPr>
-            <a:spLocks noGrp="1"/>
-          </p:cNvSpPr>
-          <p:nvPr>
-            <p:ph type="title"/>
-          </p:nvPr>
-        </p:nvSpPr>
-        <p:spPr>
-          <a:xfrm>
-            <a:off x="20053" y="152400"/>
-            <a:ext cx="8229600" cy="1143000"/>
-          </a:xfrm>
-        </p:spPr>
-        <p:txBody>
-          <a:bodyPr/>
-          <a:lstStyle/>
-          <a:p>
-            <a:r>
-              <a:rPr lang="en-IN" dirty="0"/>
-              <a:t>Read one mail</a:t>
-            </a:r>
-          </a:p>
-        </p:txBody>
-      </p:sp>
-      <p:pic>
-        <p:nvPicPr>
-          <p:cNvPr id="4" name="Picture 3">
-            <a:extLst>
-              <a:ext uri="{FF2B5EF4-FFF2-40B4-BE49-F238E27FC236}">
-                <a16:creationId xmlns:a16="http://schemas.microsoft.com/office/drawing/2014/main" id="{085A2AE6-F262-48ED-8918-9F2834D6C07A}"/>
-              </a:ext>
-            </a:extLst>
-          </p:cNvPr>
-          <p:cNvPicPr>
-            <a:picLocks noChangeAspect="1"/>
-          </p:cNvPicPr>
-          <p:nvPr/>
-        </p:nvPicPr>
-        <p:blipFill>
-          <a:blip r:embed="rId2"/>
-          <a:stretch>
-            <a:fillRect/>
-          </a:stretch>
-        </p:blipFill>
-        <p:spPr>
-          <a:xfrm>
-            <a:off x="1746377" y="1371600"/>
-            <a:ext cx="4776952" cy="5181600"/>
-          </a:xfrm>
-          <a:prstGeom prst="rect">
-            <a:avLst/>
-          </a:prstGeom>
-        </p:spPr>
-      </p:pic>
-    </p:spTree>
-    <p:extLst>
-      <p:ext uri="{BB962C8B-B14F-4D97-AF65-F5344CB8AC3E}">
-        <p14:creationId xmlns:p14="http://schemas.microsoft.com/office/powerpoint/2010/main" val="1355859977"/>
       </p:ext>
     </p:extLst>
   </p:cSld>
@@ -6301,7 +7254,7 @@
           <p:cNvPr id="2" name="Title 1">
             <a:extLst>
               <a:ext uri="{FF2B5EF4-FFF2-40B4-BE49-F238E27FC236}">
-                <a16:creationId xmlns:a16="http://schemas.microsoft.com/office/drawing/2014/main" id="{8F0FC92C-E641-4C46-894C-43CD30DADB96}"/>
+                <a16:creationId xmlns:a16="http://schemas.microsoft.com/office/drawing/2014/main" id="{B417B757-8386-414F-986A-2A206620C5F5}"/>
               </a:ext>
             </a:extLst>
           </p:cNvPr>
@@ -6314,7 +7267,7 @@
         </p:nvSpPr>
         <p:spPr>
           <a:xfrm>
-            <a:off x="533400" y="76200"/>
+            <a:off x="20053" y="152400"/>
             <a:ext cx="8229600" cy="1143000"/>
           </a:xfrm>
         </p:spPr>
@@ -6324,26 +7277,24 @@
           <a:p>
             <a:r>
               <a:rPr lang="en-IN" dirty="0"/>
-              <a:t>Activities</a:t>
+              <a:t>Read one mail</a:t>
             </a:r>
           </a:p>
         </p:txBody>
       </p:sp>
       <p:pic>
         <p:nvPicPr>
-          <p:cNvPr id="5" name="Content Placeholder 4">
+          <p:cNvPr id="4" name="Picture 3">
             <a:extLst>
               <a:ext uri="{FF2B5EF4-FFF2-40B4-BE49-F238E27FC236}">
-                <a16:creationId xmlns:a16="http://schemas.microsoft.com/office/drawing/2014/main" id="{BC57A0F2-0EB4-42EC-A77D-43165DA0FB95}"/>
+                <a16:creationId xmlns:a16="http://schemas.microsoft.com/office/drawing/2014/main" id="{085A2AE6-F262-48ED-8918-9F2834D6C07A}"/>
               </a:ext>
             </a:extLst>
           </p:cNvPr>
           <p:cNvPicPr>
-            <a:picLocks noGrp="1" noChangeAspect="1"/>
+            <a:picLocks noChangeAspect="1"/>
           </p:cNvPicPr>
-          <p:nvPr>
-            <p:ph idx="1"/>
-          </p:nvPr>
+          <p:nvPr/>
         </p:nvPicPr>
         <p:blipFill>
           <a:blip r:embed="rId2"/>
@@ -6353,63 +7304,18 @@
         </p:blipFill>
         <p:spPr>
           <a:xfrm>
-            <a:off x="2362200" y="1219200"/>
-            <a:ext cx="4188574" cy="5105400"/>
+            <a:off x="1746377" y="1371600"/>
+            <a:ext cx="4776952" cy="5181600"/>
           </a:xfrm>
           <a:prstGeom prst="rect">
             <a:avLst/>
           </a:prstGeom>
         </p:spPr>
       </p:pic>
-      <p:sp>
-        <p:nvSpPr>
-          <p:cNvPr id="8" name="TextBox 7">
-            <a:extLst>
-              <a:ext uri="{FF2B5EF4-FFF2-40B4-BE49-F238E27FC236}">
-                <a16:creationId xmlns:a16="http://schemas.microsoft.com/office/drawing/2014/main" id="{68388DA4-14D3-42BE-8F2A-E041ED7001CB}"/>
-              </a:ext>
-            </a:extLst>
-          </p:cNvPr>
-          <p:cNvSpPr txBox="1"/>
-          <p:nvPr/>
-        </p:nvSpPr>
-        <p:spPr>
-          <a:xfrm>
-            <a:off x="0" y="6477000"/>
-            <a:ext cx="9144000" cy="381000"/>
-          </a:xfrm>
-          <a:prstGeom prst="rect">
-            <a:avLst/>
-          </a:prstGeom>
-          <a:solidFill>
-            <a:schemeClr val="bg2">
-              <a:lumMod val="75000"/>
-            </a:schemeClr>
-          </a:solidFill>
-          <a:ln>
-            <a:solidFill>
-              <a:schemeClr val="accent1"/>
-            </a:solidFill>
-          </a:ln>
-        </p:spPr>
-        <p:txBody>
-          <a:bodyPr wrap="square" rtlCol="0">
-            <a:spAutoFit/>
-          </a:bodyPr>
-          <a:lstStyle/>
-          <a:p>
-            <a:pPr algn="ctr"/>
-            <a:r>
-              <a:rPr lang="en-US" dirty="0"/>
-              <a:t>Department of CSE, KGiSL Institute of Technology, Coimbatore</a:t>
-            </a:r>
-          </a:p>
-        </p:txBody>
-      </p:sp>
     </p:spTree>
     <p:extLst>
       <p:ext uri="{BB962C8B-B14F-4D97-AF65-F5344CB8AC3E}">
-        <p14:creationId xmlns:p14="http://schemas.microsoft.com/office/powerpoint/2010/main" val="866621081"/>
+        <p14:creationId xmlns:p14="http://schemas.microsoft.com/office/powerpoint/2010/main" val="1355859977"/>
       </p:ext>
     </p:extLst>
   </p:cSld>
@@ -6441,6 +7347,146 @@
           <p:cNvPr id="2" name="Title 1">
             <a:extLst>
               <a:ext uri="{FF2B5EF4-FFF2-40B4-BE49-F238E27FC236}">
+                <a16:creationId xmlns:a16="http://schemas.microsoft.com/office/drawing/2014/main" id="{8F0FC92C-E641-4C46-894C-43CD30DADB96}"/>
+              </a:ext>
+            </a:extLst>
+          </p:cNvPr>
+          <p:cNvSpPr>
+            <a:spLocks noGrp="1"/>
+          </p:cNvSpPr>
+          <p:nvPr>
+            <p:ph type="title"/>
+          </p:nvPr>
+        </p:nvSpPr>
+        <p:spPr>
+          <a:xfrm>
+            <a:off x="533400" y="76200"/>
+            <a:ext cx="8229600" cy="1143000"/>
+          </a:xfrm>
+        </p:spPr>
+        <p:txBody>
+          <a:bodyPr/>
+          <a:lstStyle/>
+          <a:p>
+            <a:r>
+              <a:rPr lang="en-IN" dirty="0"/>
+              <a:t>Activities</a:t>
+            </a:r>
+          </a:p>
+        </p:txBody>
+      </p:sp>
+      <p:pic>
+        <p:nvPicPr>
+          <p:cNvPr id="5" name="Content Placeholder 4">
+            <a:extLst>
+              <a:ext uri="{FF2B5EF4-FFF2-40B4-BE49-F238E27FC236}">
+                <a16:creationId xmlns:a16="http://schemas.microsoft.com/office/drawing/2014/main" id="{BC57A0F2-0EB4-42EC-A77D-43165DA0FB95}"/>
+              </a:ext>
+            </a:extLst>
+          </p:cNvPr>
+          <p:cNvPicPr>
+            <a:picLocks noGrp="1" noChangeAspect="1"/>
+          </p:cNvPicPr>
+          <p:nvPr>
+            <p:ph idx="1"/>
+          </p:nvPr>
+        </p:nvPicPr>
+        <p:blipFill>
+          <a:blip r:embed="rId2"/>
+          <a:stretch>
+            <a:fillRect/>
+          </a:stretch>
+        </p:blipFill>
+        <p:spPr>
+          <a:xfrm>
+            <a:off x="2362200" y="1219200"/>
+            <a:ext cx="4188574" cy="5105400"/>
+          </a:xfrm>
+          <a:prstGeom prst="rect">
+            <a:avLst/>
+          </a:prstGeom>
+        </p:spPr>
+      </p:pic>
+      <p:sp>
+        <p:nvSpPr>
+          <p:cNvPr id="8" name="TextBox 7">
+            <a:extLst>
+              <a:ext uri="{FF2B5EF4-FFF2-40B4-BE49-F238E27FC236}">
+                <a16:creationId xmlns:a16="http://schemas.microsoft.com/office/drawing/2014/main" id="{68388DA4-14D3-42BE-8F2A-E041ED7001CB}"/>
+              </a:ext>
+            </a:extLst>
+          </p:cNvPr>
+          <p:cNvSpPr txBox="1"/>
+          <p:nvPr/>
+        </p:nvSpPr>
+        <p:spPr>
+          <a:xfrm>
+            <a:off x="0" y="6477000"/>
+            <a:ext cx="9144000" cy="381000"/>
+          </a:xfrm>
+          <a:prstGeom prst="rect">
+            <a:avLst/>
+          </a:prstGeom>
+          <a:solidFill>
+            <a:schemeClr val="bg2">
+              <a:lumMod val="75000"/>
+            </a:schemeClr>
+          </a:solidFill>
+          <a:ln>
+            <a:solidFill>
+              <a:schemeClr val="accent1"/>
+            </a:solidFill>
+          </a:ln>
+        </p:spPr>
+        <p:txBody>
+          <a:bodyPr wrap="square" rtlCol="0">
+            <a:spAutoFit/>
+          </a:bodyPr>
+          <a:lstStyle/>
+          <a:p>
+            <a:pPr algn="ctr"/>
+            <a:r>
+              <a:rPr lang="en-US" dirty="0"/>
+              <a:t>Department of CSE, KGiSL Institute of Technology, Coimbatore</a:t>
+            </a:r>
+          </a:p>
+        </p:txBody>
+      </p:sp>
+    </p:spTree>
+    <p:extLst>
+      <p:ext uri="{BB962C8B-B14F-4D97-AF65-F5344CB8AC3E}">
+        <p14:creationId xmlns:p14="http://schemas.microsoft.com/office/powerpoint/2010/main" val="866621081"/>
+      </p:ext>
+    </p:extLst>
+  </p:cSld>
+  <p:clrMapOvr>
+    <a:masterClrMapping/>
+  </p:clrMapOvr>
+</p:sld>
+</file>
+
+<file path=ppt/slides/slide15.xml><?xml version="1.0" encoding="utf-8"?>
+<p:sld xmlns:a="http://schemas.openxmlformats.org/drawingml/2006/main" xmlns:r="http://schemas.openxmlformats.org/officeDocument/2006/relationships" xmlns:p="http://schemas.openxmlformats.org/presentationml/2006/main">
+  <p:cSld>
+    <p:spTree>
+      <p:nvGrpSpPr>
+        <p:cNvPr id="1" name=""/>
+        <p:cNvGrpSpPr/>
+        <p:nvPr/>
+      </p:nvGrpSpPr>
+      <p:grpSpPr>
+        <a:xfrm>
+          <a:off x="0" y="0"/>
+          <a:ext cx="0" cy="0"/>
+          <a:chOff x="0" y="0"/>
+          <a:chExt cx="0" cy="0"/>
+        </a:xfrm>
+      </p:grpSpPr>
+      <p:sp>
+        <p:nvSpPr>
+          <p:cNvPr id="2" name="Title 1">
+            <a:extLst>
+              <a:ext uri="{FF2B5EF4-FFF2-40B4-BE49-F238E27FC236}">
                 <a16:creationId xmlns:a16="http://schemas.microsoft.com/office/drawing/2014/main" id="{F7F2D1D3-2D4A-48A5-B273-A1FA0E15B134}"/>
               </a:ext>
             </a:extLst>
@@ -6518,7 +7564,7 @@
 </p:sld>
 </file>
 
-<file path=ppt/slides/slide15.xml><?xml version="1.0" encoding="utf-8"?>
+<file path=ppt/slides/slide16.xml><?xml version="1.0" encoding="utf-8"?>
 <p:sld xmlns:a="http://schemas.openxmlformats.org/drawingml/2006/main" xmlns:r="http://schemas.openxmlformats.org/officeDocument/2006/relationships" xmlns:p="http://schemas.openxmlformats.org/presentationml/2006/main">
   <p:cSld>
     <p:spTree>
@@ -6730,7 +7776,7 @@
 </p:sld>
 </file>
 
-<file path=ppt/slides/slide16.xml><?xml version="1.0" encoding="utf-8"?>
+<file path=ppt/slides/slide17.xml><?xml version="1.0" encoding="utf-8"?>
 <p:sld xmlns:a="http://schemas.openxmlformats.org/drawingml/2006/main" xmlns:r="http://schemas.openxmlformats.org/officeDocument/2006/relationships" xmlns:p="http://schemas.openxmlformats.org/presentationml/2006/main">
   <p:cSld>
     <p:spTree>
@@ -6821,7 +7867,7 @@
 </p:sld>
 </file>
 
-<file path=ppt/slides/slide17.xml><?xml version="1.0" encoding="utf-8"?>
+<file path=ppt/slides/slide18.xml><?xml version="1.0" encoding="utf-8"?>
 <p:sld xmlns:a="http://schemas.openxmlformats.org/drawingml/2006/main" xmlns:r="http://schemas.openxmlformats.org/officeDocument/2006/relationships" xmlns:p="http://schemas.openxmlformats.org/presentationml/2006/main">
   <p:cSld>
     <p:spTree>
@@ -7001,7 +8047,7 @@
 </p:sld>
 </file>
 
-<file path=ppt/slides/slide18.xml><?xml version="1.0" encoding="utf-8"?>
+<file path=ppt/slides/slide19.xml><?xml version="1.0" encoding="utf-8"?>
 <p:sld xmlns:a="http://schemas.openxmlformats.org/drawingml/2006/main" xmlns:r="http://schemas.openxmlformats.org/officeDocument/2006/relationships" xmlns:p="http://schemas.openxmlformats.org/presentationml/2006/main">
   <p:cSld>
     <p:spTree>
@@ -7436,7 +8482,124 @@
 </p:sld>
 </file>
 
-<file path=ppt/slides/slide19.xml><?xml version="1.0" encoding="utf-8"?>
+<file path=ppt/slides/slide2.xml><?xml version="1.0" encoding="utf-8"?>
+<p:sld xmlns:a="http://schemas.openxmlformats.org/drawingml/2006/main" xmlns:r="http://schemas.openxmlformats.org/officeDocument/2006/relationships" xmlns:p="http://schemas.openxmlformats.org/presentationml/2006/main">
+  <p:cSld>
+    <p:spTree>
+      <p:nvGrpSpPr>
+        <p:cNvPr id="1" name=""/>
+        <p:cNvGrpSpPr/>
+        <p:nvPr/>
+      </p:nvGrpSpPr>
+      <p:grpSpPr>
+        <a:xfrm>
+          <a:off x="0" y="0"/>
+          <a:ext cx="0" cy="0"/>
+          <a:chOff x="0" y="0"/>
+          <a:chExt cx="0" cy="0"/>
+        </a:xfrm>
+      </p:grpSpPr>
+      <p:sp>
+        <p:nvSpPr>
+          <p:cNvPr id="2" name="Title 1"/>
+          <p:cNvSpPr>
+            <a:spLocks noGrp="1"/>
+          </p:cNvSpPr>
+          <p:nvPr>
+            <p:ph type="title"/>
+          </p:nvPr>
+        </p:nvSpPr>
+        <p:spPr>
+          <a:xfrm>
+            <a:off x="304800" y="1066800"/>
+            <a:ext cx="8229600" cy="4800600"/>
+          </a:xfrm>
+        </p:spPr>
+        <p:txBody>
+          <a:bodyPr>
+            <a:normAutofit fontScale="90000"/>
+          </a:bodyPr>
+          <a:lstStyle/>
+          <a:p>
+            <a:r>
+              <a:rPr lang="en-US" sz="4400" dirty="0"/>
+              <a:t>Abstract</a:t>
+            </a:r>
+            <a:br>
+              <a:rPr lang="en-US" sz="4400" dirty="0"/>
+            </a:br>
+            <a:r>
+              <a:rPr lang="en-US" sz="3600" dirty="0">
+                <a:solidFill>
+                  <a:schemeClr val="tx1"/>
+                </a:solidFill>
+                <a:latin typeface="Cambria" panose="02040503050406030204" pitchFamily="18" charset="0"/>
+              </a:rPr>
+              <a:t>	</a:t>
+            </a:r>
+            <a:r>
+              <a:rPr lang="en-US" sz="3100" dirty="0">
+                <a:solidFill>
+                  <a:schemeClr val="tx1"/>
+                </a:solidFill>
+                <a:latin typeface="Cambria" panose="02040503050406030204" pitchFamily="18" charset="0"/>
+              </a:rPr>
+              <a:t>Eliminate manual intervention in ticket creation, so raise a ticket based on the complaint mail. If the details are incomplete (e.g. customer id is missing), send a mail to customer asking for missing details and Link the subsequent responses from the customer to the original ticket. Recognize the bounced mails and initiate appropriate action via sending auto response to template-based mails (complaints/queries) i.e. no free text.</a:t>
+            </a:r>
+            <a:endParaRPr lang="en-US" sz="4000" dirty="0">
+              <a:latin typeface="Cambria" pitchFamily="18" charset="0"/>
+            </a:endParaRPr>
+          </a:p>
+        </p:txBody>
+      </p:sp>
+      <p:sp>
+        <p:nvSpPr>
+          <p:cNvPr id="5" name="TextBox 4"/>
+          <p:cNvSpPr txBox="1"/>
+          <p:nvPr/>
+        </p:nvSpPr>
+        <p:spPr>
+          <a:xfrm>
+            <a:off x="0" y="6477000"/>
+            <a:ext cx="9144000" cy="381000"/>
+          </a:xfrm>
+          <a:prstGeom prst="rect">
+            <a:avLst/>
+          </a:prstGeom>
+          <a:solidFill>
+            <a:schemeClr val="bg2">
+              <a:lumMod val="75000"/>
+            </a:schemeClr>
+          </a:solidFill>
+          <a:ln>
+            <a:solidFill>
+              <a:schemeClr val="accent1"/>
+            </a:solidFill>
+          </a:ln>
+        </p:spPr>
+        <p:txBody>
+          <a:bodyPr wrap="square" rtlCol="0">
+            <a:spAutoFit/>
+          </a:bodyPr>
+          <a:lstStyle/>
+          <a:p>
+            <a:pPr algn="ctr"/>
+            <a:r>
+              <a:rPr lang="en-US" dirty="0"/>
+              <a:t>Department of CSE, KGiSL Institute of Technology, Coimbatore</a:t>
+            </a:r>
+          </a:p>
+        </p:txBody>
+      </p:sp>
+    </p:spTree>
+  </p:cSld>
+  <p:clrMapOvr>
+    <a:masterClrMapping/>
+  </p:clrMapOvr>
+</p:sld>
+</file>
+
+<file path=ppt/slides/slide20.xml><?xml version="1.0" encoding="utf-8"?>
 <p:sld xmlns:a="http://schemas.openxmlformats.org/drawingml/2006/main" xmlns:r="http://schemas.openxmlformats.org/officeDocument/2006/relationships" xmlns:p="http://schemas.openxmlformats.org/presentationml/2006/main">
   <p:cSld>
     <p:spTree>
@@ -7528,124 +8691,7 @@
 </p:sld>
 </file>
 
-<file path=ppt/slides/slide2.xml><?xml version="1.0" encoding="utf-8"?>
-<p:sld xmlns:a="http://schemas.openxmlformats.org/drawingml/2006/main" xmlns:r="http://schemas.openxmlformats.org/officeDocument/2006/relationships" xmlns:p="http://schemas.openxmlformats.org/presentationml/2006/main">
-  <p:cSld>
-    <p:spTree>
-      <p:nvGrpSpPr>
-        <p:cNvPr id="1" name=""/>
-        <p:cNvGrpSpPr/>
-        <p:nvPr/>
-      </p:nvGrpSpPr>
-      <p:grpSpPr>
-        <a:xfrm>
-          <a:off x="0" y="0"/>
-          <a:ext cx="0" cy="0"/>
-          <a:chOff x="0" y="0"/>
-          <a:chExt cx="0" cy="0"/>
-        </a:xfrm>
-      </p:grpSpPr>
-      <p:sp>
-        <p:nvSpPr>
-          <p:cNvPr id="2" name="Title 1"/>
-          <p:cNvSpPr>
-            <a:spLocks noGrp="1"/>
-          </p:cNvSpPr>
-          <p:nvPr>
-            <p:ph type="title"/>
-          </p:nvPr>
-        </p:nvSpPr>
-        <p:spPr>
-          <a:xfrm>
-            <a:off x="304800" y="1066800"/>
-            <a:ext cx="8229600" cy="4800600"/>
-          </a:xfrm>
-        </p:spPr>
-        <p:txBody>
-          <a:bodyPr>
-            <a:normAutofit fontScale="90000"/>
-          </a:bodyPr>
-          <a:lstStyle/>
-          <a:p>
-            <a:r>
-              <a:rPr lang="en-US" sz="4400" dirty="0"/>
-              <a:t>Abstract</a:t>
-            </a:r>
-            <a:br>
-              <a:rPr lang="en-US" sz="4400" dirty="0"/>
-            </a:br>
-            <a:r>
-              <a:rPr lang="en-US" sz="3600" dirty="0">
-                <a:solidFill>
-                  <a:schemeClr val="tx1"/>
-                </a:solidFill>
-                <a:latin typeface="Cambria" panose="02040503050406030204" pitchFamily="18" charset="0"/>
-              </a:rPr>
-              <a:t>	</a:t>
-            </a:r>
-            <a:r>
-              <a:rPr lang="en-US" sz="3100" dirty="0">
-                <a:solidFill>
-                  <a:schemeClr val="tx1"/>
-                </a:solidFill>
-                <a:latin typeface="Cambria" panose="02040503050406030204" pitchFamily="18" charset="0"/>
-              </a:rPr>
-              <a:t>Eliminate manual intervention in ticket creation, so raise a ticket based on the complaint mail. If the details are incomplete (e.g. customer id is missing), send a mail to customer asking for missing details and Link the subsequent responses from the customer to the original ticket. Recognize the bounced mails and initiate appropriate action via sending auto response to template-based mails (complaints/queries) i.e. no free text.</a:t>
-            </a:r>
-            <a:endParaRPr lang="en-US" sz="4000" dirty="0">
-              <a:latin typeface="Cambria" pitchFamily="18" charset="0"/>
-            </a:endParaRPr>
-          </a:p>
-        </p:txBody>
-      </p:sp>
-      <p:sp>
-        <p:nvSpPr>
-          <p:cNvPr id="5" name="TextBox 4"/>
-          <p:cNvSpPr txBox="1"/>
-          <p:nvPr/>
-        </p:nvSpPr>
-        <p:spPr>
-          <a:xfrm>
-            <a:off x="0" y="6477000"/>
-            <a:ext cx="9144000" cy="381000"/>
-          </a:xfrm>
-          <a:prstGeom prst="rect">
-            <a:avLst/>
-          </a:prstGeom>
-          <a:solidFill>
-            <a:schemeClr val="bg2">
-              <a:lumMod val="75000"/>
-            </a:schemeClr>
-          </a:solidFill>
-          <a:ln>
-            <a:solidFill>
-              <a:schemeClr val="accent1"/>
-            </a:solidFill>
-          </a:ln>
-        </p:spPr>
-        <p:txBody>
-          <a:bodyPr wrap="square" rtlCol="0">
-            <a:spAutoFit/>
-          </a:bodyPr>
-          <a:lstStyle/>
-          <a:p>
-            <a:pPr algn="ctr"/>
-            <a:r>
-              <a:rPr lang="en-US" dirty="0"/>
-              <a:t>Department of CSE, KGiSL Institute of Technology, Coimbatore</a:t>
-            </a:r>
-          </a:p>
-        </p:txBody>
-      </p:sp>
-    </p:spTree>
-  </p:cSld>
-  <p:clrMapOvr>
-    <a:masterClrMapping/>
-  </p:clrMapOvr>
-</p:sld>
-</file>
-
-<file path=ppt/slides/slide20.xml><?xml version="1.0" encoding="utf-8"?>
+<file path=ppt/slides/slide21.xml><?xml version="1.0" encoding="utf-8"?>
 <p:sld xmlns:a="http://schemas.openxmlformats.org/drawingml/2006/main" xmlns:r="http://schemas.openxmlformats.org/officeDocument/2006/relationships" xmlns:p="http://schemas.openxmlformats.org/presentationml/2006/main">
   <p:cSld>
     <p:spTree>
@@ -7707,7 +8753,7 @@
 </p:sld>
 </file>
 
-<file path=ppt/slides/slide21.xml><?xml version="1.0" encoding="utf-8"?>
+<file path=ppt/slides/slide22.xml><?xml version="1.0" encoding="utf-8"?>
 <p:sld xmlns:a="http://schemas.openxmlformats.org/drawingml/2006/main" xmlns:r="http://schemas.openxmlformats.org/officeDocument/2006/relationships" xmlns:p="http://schemas.openxmlformats.org/presentationml/2006/main">
   <p:cSld>
     <p:spTree>
@@ -7801,7 +8847,7 @@
 </p:sld>
 </file>
 
-<file path=ppt/slides/slide22.xml><?xml version="1.0" encoding="utf-8"?>
+<file path=ppt/slides/slide23.xml><?xml version="1.0" encoding="utf-8"?>
 <p:sld xmlns:a="http://schemas.openxmlformats.org/drawingml/2006/main" xmlns:r="http://schemas.openxmlformats.org/officeDocument/2006/relationships" xmlns:p="http://schemas.openxmlformats.org/presentationml/2006/main">
   <p:cSld>
     <p:spTree>
@@ -7895,7 +8941,7 @@
 </p:sld>
 </file>
 
-<file path=ppt/slides/slide23.xml><?xml version="1.0" encoding="utf-8"?>
+<file path=ppt/slides/slide24.xml><?xml version="1.0" encoding="utf-8"?>
 <p:sld xmlns:a="http://schemas.openxmlformats.org/drawingml/2006/main" xmlns:r="http://schemas.openxmlformats.org/officeDocument/2006/relationships" xmlns:p="http://schemas.openxmlformats.org/presentationml/2006/main">
   <p:cSld>
     <p:spTree>
@@ -8033,7 +9079,7 @@
 </p:sld>
 </file>
 
-<file path=ppt/slides/slide24.xml><?xml version="1.0" encoding="utf-8"?>
+<file path=ppt/slides/slide25.xml><?xml version="1.0" encoding="utf-8"?>
 <p:sld xmlns:a="http://schemas.openxmlformats.org/drawingml/2006/main" xmlns:r="http://schemas.openxmlformats.org/officeDocument/2006/relationships" xmlns:p="http://schemas.openxmlformats.org/presentationml/2006/main">
   <p:cSld>
     <p:spTree>
@@ -8126,7 +9172,7 @@
 </p:sld>
 </file>
 
-<file path=ppt/slides/slide25.xml><?xml version="1.0" encoding="utf-8"?>
+<file path=ppt/slides/slide26.xml><?xml version="1.0" encoding="utf-8"?>
 <p:sld xmlns:a="http://schemas.openxmlformats.org/drawingml/2006/main" xmlns:r="http://schemas.openxmlformats.org/officeDocument/2006/relationships" xmlns:p="http://schemas.openxmlformats.org/presentationml/2006/main">
   <p:cSld>
     <p:spTree>
@@ -8219,7 +9265,7 @@
 </p:sld>
 </file>
 
-<file path=ppt/slides/slide26.xml><?xml version="1.0" encoding="utf-8"?>
+<file path=ppt/slides/slide27.xml><?xml version="1.0" encoding="utf-8"?>
 <p:sld xmlns:a="http://schemas.openxmlformats.org/drawingml/2006/main" xmlns:r="http://schemas.openxmlformats.org/officeDocument/2006/relationships" xmlns:p="http://schemas.openxmlformats.org/presentationml/2006/main">
   <p:cSld>
     <p:spTree>
@@ -8345,144 +9391,6 @@
         </p:txBody>
       </p:sp>
     </p:spTree>
-  </p:cSld>
-  <p:clrMapOvr>
-    <a:masterClrMapping/>
-  </p:clrMapOvr>
-</p:sld>
-</file>
-
-<file path=ppt/slides/slide27.xml><?xml version="1.0" encoding="utf-8"?>
-<p:sld xmlns:a="http://schemas.openxmlformats.org/drawingml/2006/main" xmlns:r="http://schemas.openxmlformats.org/officeDocument/2006/relationships" xmlns:p="http://schemas.openxmlformats.org/presentationml/2006/main">
-  <p:cSld>
-    <p:spTree>
-      <p:nvGrpSpPr>
-        <p:cNvPr id="1" name=""/>
-        <p:cNvGrpSpPr/>
-        <p:nvPr/>
-      </p:nvGrpSpPr>
-      <p:grpSpPr>
-        <a:xfrm>
-          <a:off x="0" y="0"/>
-          <a:ext cx="0" cy="0"/>
-          <a:chOff x="0" y="0"/>
-          <a:chExt cx="0" cy="0"/>
-        </a:xfrm>
-      </p:grpSpPr>
-      <p:sp>
-        <p:nvSpPr>
-          <p:cNvPr id="6" name="TextBox 5">
-            <a:extLst>
-              <a:ext uri="{FF2B5EF4-FFF2-40B4-BE49-F238E27FC236}">
-                <a16:creationId xmlns:a16="http://schemas.microsoft.com/office/drawing/2014/main" id="{0D321512-82F9-4087-8D78-818B58162A4F}"/>
-              </a:ext>
-            </a:extLst>
-          </p:cNvPr>
-          <p:cNvSpPr txBox="1"/>
-          <p:nvPr/>
-        </p:nvSpPr>
-        <p:spPr>
-          <a:xfrm>
-            <a:off x="0" y="6477000"/>
-            <a:ext cx="9144000" cy="381000"/>
-          </a:xfrm>
-          <a:prstGeom prst="rect">
-            <a:avLst/>
-          </a:prstGeom>
-          <a:solidFill>
-            <a:schemeClr val="bg2">
-              <a:lumMod val="75000"/>
-            </a:schemeClr>
-          </a:solidFill>
-          <a:ln>
-            <a:solidFill>
-              <a:schemeClr val="accent1"/>
-            </a:solidFill>
-          </a:ln>
-        </p:spPr>
-        <p:txBody>
-          <a:bodyPr wrap="square" rtlCol="0">
-            <a:spAutoFit/>
-          </a:bodyPr>
-          <a:lstStyle/>
-          <a:p>
-            <a:pPr algn="ctr"/>
-            <a:r>
-              <a:rPr lang="en-US" dirty="0"/>
-              <a:t>Department of CSE, KGiSL Institute of Technology, Coimbatore</a:t>
-            </a:r>
-          </a:p>
-        </p:txBody>
-      </p:sp>
-      <p:pic>
-        <p:nvPicPr>
-          <p:cNvPr id="3" name="Picture 2">
-            <a:extLst>
-              <a:ext uri="{FF2B5EF4-FFF2-40B4-BE49-F238E27FC236}">
-                <a16:creationId xmlns:a16="http://schemas.microsoft.com/office/drawing/2014/main" id="{5A89C988-B681-4EA5-A53F-5CFDC6FAE6DA}"/>
-              </a:ext>
-            </a:extLst>
-          </p:cNvPr>
-          <p:cNvPicPr>
-            <a:picLocks noChangeAspect="1"/>
-          </p:cNvPicPr>
-          <p:nvPr/>
-        </p:nvPicPr>
-        <p:blipFill>
-          <a:blip r:embed="rId2"/>
-          <a:stretch>
-            <a:fillRect/>
-          </a:stretch>
-        </p:blipFill>
-        <p:spPr>
-          <a:xfrm>
-            <a:off x="780721" y="1851523"/>
-            <a:ext cx="7582557" cy="3154953"/>
-          </a:xfrm>
-          <a:prstGeom prst="rect">
-            <a:avLst/>
-          </a:prstGeom>
-        </p:spPr>
-      </p:pic>
-      <p:sp>
-        <p:nvSpPr>
-          <p:cNvPr id="4" name="Title 1">
-            <a:extLst>
-              <a:ext uri="{FF2B5EF4-FFF2-40B4-BE49-F238E27FC236}">
-                <a16:creationId xmlns:a16="http://schemas.microsoft.com/office/drawing/2014/main" id="{777BBF5B-25E5-4810-855F-4E3490FCBCF2}"/>
-              </a:ext>
-            </a:extLst>
-          </p:cNvPr>
-          <p:cNvSpPr>
-            <a:spLocks noGrp="1"/>
-          </p:cNvSpPr>
-          <p:nvPr>
-            <p:ph type="title"/>
-          </p:nvPr>
-        </p:nvSpPr>
-        <p:spPr>
-          <a:xfrm>
-            <a:off x="457200" y="381000"/>
-            <a:ext cx="8229600" cy="990600"/>
-          </a:xfrm>
-        </p:spPr>
-        <p:txBody>
-          <a:bodyPr/>
-          <a:lstStyle/>
-          <a:p>
-            <a:r>
-              <a:rPr lang="en-IN" dirty="0"/>
-              <a:t>Database (Excel)</a:t>
-            </a:r>
-          </a:p>
-        </p:txBody>
-      </p:sp>
-    </p:spTree>
-    <p:extLst>
-      <p:ext uri="{BB962C8B-B14F-4D97-AF65-F5344CB8AC3E}">
-        <p14:creationId xmlns:p14="http://schemas.microsoft.com/office/powerpoint/2010/main" val="2525070970"/>
-      </p:ext>
-    </p:extLst>
   </p:cSld>
   <p:clrMapOvr>
     <a:masterClrMapping/>
@@ -8554,10 +9462,10 @@
       </p:sp>
       <p:pic>
         <p:nvPicPr>
-          <p:cNvPr id="2" name="Picture 1">
+          <p:cNvPr id="3" name="Picture 2">
             <a:extLst>
               <a:ext uri="{FF2B5EF4-FFF2-40B4-BE49-F238E27FC236}">
-                <a16:creationId xmlns:a16="http://schemas.microsoft.com/office/drawing/2014/main" id="{B72CE973-F9C4-4D5A-81C4-C8A0FE4B311C}"/>
+                <a16:creationId xmlns:a16="http://schemas.microsoft.com/office/drawing/2014/main" id="{5A89C988-B681-4EA5-A53F-5CFDC6FAE6DA}"/>
               </a:ext>
             </a:extLst>
           </p:cNvPr>
@@ -8574,8 +9482,8 @@
         </p:blipFill>
         <p:spPr>
           <a:xfrm>
-            <a:off x="0" y="1295400"/>
-            <a:ext cx="9144000" cy="3581400"/>
+            <a:off x="780721" y="1851523"/>
+            <a:ext cx="7582557" cy="3154953"/>
           </a:xfrm>
           <a:prstGeom prst="rect">
             <a:avLst/>
@@ -8587,7 +9495,7 @@
           <p:cNvPr id="4" name="Title 1">
             <a:extLst>
               <a:ext uri="{FF2B5EF4-FFF2-40B4-BE49-F238E27FC236}">
-                <a16:creationId xmlns:a16="http://schemas.microsoft.com/office/drawing/2014/main" id="{CA00E430-22BB-4BF8-8090-246E564E9D11}"/>
+                <a16:creationId xmlns:a16="http://schemas.microsoft.com/office/drawing/2014/main" id="{777BBF5B-25E5-4810-855F-4E3490FCBCF2}"/>
               </a:ext>
             </a:extLst>
           </p:cNvPr>
@@ -8610,7 +9518,7 @@
           <a:p>
             <a:r>
               <a:rPr lang="en-IN" dirty="0"/>
-              <a:t>Template Mail</a:t>
+              <a:t>Database (Excel)</a:t>
             </a:r>
           </a:p>
         </p:txBody>
@@ -8618,7 +9526,7 @@
     </p:spTree>
     <p:extLst>
       <p:ext uri="{BB962C8B-B14F-4D97-AF65-F5344CB8AC3E}">
-        <p14:creationId xmlns:p14="http://schemas.microsoft.com/office/powerpoint/2010/main" val="812482564"/>
+        <p14:creationId xmlns:p14="http://schemas.microsoft.com/office/powerpoint/2010/main" val="2525070970"/>
       </p:ext>
     </p:extLst>
   </p:cSld>
@@ -8692,10 +9600,10 @@
       </p:sp>
       <p:pic>
         <p:nvPicPr>
-          <p:cNvPr id="5" name="Picture 4">
+          <p:cNvPr id="2" name="Picture 1">
             <a:extLst>
               <a:ext uri="{FF2B5EF4-FFF2-40B4-BE49-F238E27FC236}">
-                <a16:creationId xmlns:a16="http://schemas.microsoft.com/office/drawing/2014/main" id="{5FFB55B5-2D9D-4C7C-9D75-7C612FE90887}"/>
+                <a16:creationId xmlns:a16="http://schemas.microsoft.com/office/drawing/2014/main" id="{B72CE973-F9C4-4D5A-81C4-C8A0FE4B311C}"/>
               </a:ext>
             </a:extLst>
           </p:cNvPr>
@@ -8712,8 +9620,8 @@
         </p:blipFill>
         <p:spPr>
           <a:xfrm>
-            <a:off x="0" y="1371600"/>
-            <a:ext cx="9144000" cy="5143500"/>
+            <a:off x="0" y="1295400"/>
+            <a:ext cx="9144000" cy="3581400"/>
           </a:xfrm>
           <a:prstGeom prst="rect">
             <a:avLst/>
@@ -8722,10 +9630,10 @@
       </p:pic>
       <p:sp>
         <p:nvSpPr>
-          <p:cNvPr id="7" name="Title 1">
+          <p:cNvPr id="4" name="Title 1">
             <a:extLst>
               <a:ext uri="{FF2B5EF4-FFF2-40B4-BE49-F238E27FC236}">
-                <a16:creationId xmlns:a16="http://schemas.microsoft.com/office/drawing/2014/main" id="{11E1FCA2-44ED-4EE9-BA31-DFEA3CDC6CE0}"/>
+                <a16:creationId xmlns:a16="http://schemas.microsoft.com/office/drawing/2014/main" id="{CA00E430-22BB-4BF8-8090-246E564E9D11}"/>
               </a:ext>
             </a:extLst>
           </p:cNvPr>
@@ -8748,7 +9656,7 @@
           <a:p>
             <a:r>
               <a:rPr lang="en-IN" dirty="0"/>
-              <a:t>Ticket Raising</a:t>
+              <a:t>Template Mail</a:t>
             </a:r>
           </a:p>
         </p:txBody>
@@ -8756,7 +9664,7 @@
     </p:spTree>
     <p:extLst>
       <p:ext uri="{BB962C8B-B14F-4D97-AF65-F5344CB8AC3E}">
-        <p14:creationId xmlns:p14="http://schemas.microsoft.com/office/powerpoint/2010/main" val="526850897"/>
+        <p14:creationId xmlns:p14="http://schemas.microsoft.com/office/powerpoint/2010/main" val="812482564"/>
       </p:ext>
     </p:extLst>
   </p:cSld>
@@ -9109,10 +10017,10 @@
       </p:sp>
       <p:pic>
         <p:nvPicPr>
-          <p:cNvPr id="2" name="Picture 1">
+          <p:cNvPr id="5" name="Picture 4">
             <a:extLst>
               <a:ext uri="{FF2B5EF4-FFF2-40B4-BE49-F238E27FC236}">
-                <a16:creationId xmlns:a16="http://schemas.microsoft.com/office/drawing/2014/main" id="{463C7E80-C8AA-45F0-90A3-AC8A0B11F25B}"/>
+                <a16:creationId xmlns:a16="http://schemas.microsoft.com/office/drawing/2014/main" id="{5FFB55B5-2D9D-4C7C-9D75-7C612FE90887}"/>
               </a:ext>
             </a:extLst>
           </p:cNvPr>
@@ -9129,7 +10037,7 @@
         </p:blipFill>
         <p:spPr>
           <a:xfrm>
-            <a:off x="152400" y="1333500"/>
+            <a:off x="0" y="1371600"/>
             <a:ext cx="9144000" cy="5143500"/>
           </a:xfrm>
           <a:prstGeom prst="rect">
@@ -9142,7 +10050,7 @@
           <p:cNvPr id="7" name="Title 1">
             <a:extLst>
               <a:ext uri="{FF2B5EF4-FFF2-40B4-BE49-F238E27FC236}">
-                <a16:creationId xmlns:a16="http://schemas.microsoft.com/office/drawing/2014/main" id="{632DA9FD-A73F-4007-B922-B5D6D681B633}"/>
+                <a16:creationId xmlns:a16="http://schemas.microsoft.com/office/drawing/2014/main" id="{11E1FCA2-44ED-4EE9-BA31-DFEA3CDC6CE0}"/>
               </a:ext>
             </a:extLst>
           </p:cNvPr>
@@ -9165,7 +10073,7 @@
           <a:p>
             <a:r>
               <a:rPr lang="en-IN" dirty="0"/>
-              <a:t>Support Team</a:t>
+              <a:t>Ticket Raising</a:t>
             </a:r>
           </a:p>
         </p:txBody>
@@ -9173,7 +10081,7 @@
     </p:spTree>
     <p:extLst>
       <p:ext uri="{BB962C8B-B14F-4D97-AF65-F5344CB8AC3E}">
-        <p14:creationId xmlns:p14="http://schemas.microsoft.com/office/powerpoint/2010/main" val="3611138693"/>
+        <p14:creationId xmlns:p14="http://schemas.microsoft.com/office/powerpoint/2010/main" val="526850897"/>
       </p:ext>
     </p:extLst>
   </p:cSld>
@@ -9250,6 +10158,144 @@
           <p:cNvPr id="2" name="Picture 1">
             <a:extLst>
               <a:ext uri="{FF2B5EF4-FFF2-40B4-BE49-F238E27FC236}">
+                <a16:creationId xmlns:a16="http://schemas.microsoft.com/office/drawing/2014/main" id="{463C7E80-C8AA-45F0-90A3-AC8A0B11F25B}"/>
+              </a:ext>
+            </a:extLst>
+          </p:cNvPr>
+          <p:cNvPicPr>
+            <a:picLocks noChangeAspect="1"/>
+          </p:cNvPicPr>
+          <p:nvPr/>
+        </p:nvPicPr>
+        <p:blipFill>
+          <a:blip r:embed="rId2"/>
+          <a:stretch>
+            <a:fillRect/>
+          </a:stretch>
+        </p:blipFill>
+        <p:spPr>
+          <a:xfrm>
+            <a:off x="152400" y="1333500"/>
+            <a:ext cx="9144000" cy="5143500"/>
+          </a:xfrm>
+          <a:prstGeom prst="rect">
+            <a:avLst/>
+          </a:prstGeom>
+        </p:spPr>
+      </p:pic>
+      <p:sp>
+        <p:nvSpPr>
+          <p:cNvPr id="7" name="Title 1">
+            <a:extLst>
+              <a:ext uri="{FF2B5EF4-FFF2-40B4-BE49-F238E27FC236}">
+                <a16:creationId xmlns:a16="http://schemas.microsoft.com/office/drawing/2014/main" id="{632DA9FD-A73F-4007-B922-B5D6D681B633}"/>
+              </a:ext>
+            </a:extLst>
+          </p:cNvPr>
+          <p:cNvSpPr>
+            <a:spLocks noGrp="1"/>
+          </p:cNvSpPr>
+          <p:nvPr>
+            <p:ph type="title"/>
+          </p:nvPr>
+        </p:nvSpPr>
+        <p:spPr>
+          <a:xfrm>
+            <a:off x="457200" y="381000"/>
+            <a:ext cx="8229600" cy="990600"/>
+          </a:xfrm>
+        </p:spPr>
+        <p:txBody>
+          <a:bodyPr/>
+          <a:lstStyle/>
+          <a:p>
+            <a:r>
+              <a:rPr lang="en-IN" dirty="0"/>
+              <a:t>Support Team</a:t>
+            </a:r>
+          </a:p>
+        </p:txBody>
+      </p:sp>
+    </p:spTree>
+    <p:extLst>
+      <p:ext uri="{BB962C8B-B14F-4D97-AF65-F5344CB8AC3E}">
+        <p14:creationId xmlns:p14="http://schemas.microsoft.com/office/powerpoint/2010/main" val="3611138693"/>
+      </p:ext>
+    </p:extLst>
+  </p:cSld>
+  <p:clrMapOvr>
+    <a:masterClrMapping/>
+  </p:clrMapOvr>
+</p:sld>
+</file>
+
+<file path=ppt/slides/slide32.xml><?xml version="1.0" encoding="utf-8"?>
+<p:sld xmlns:a="http://schemas.openxmlformats.org/drawingml/2006/main" xmlns:r="http://schemas.openxmlformats.org/officeDocument/2006/relationships" xmlns:p="http://schemas.openxmlformats.org/presentationml/2006/main">
+  <p:cSld>
+    <p:spTree>
+      <p:nvGrpSpPr>
+        <p:cNvPr id="1" name=""/>
+        <p:cNvGrpSpPr/>
+        <p:nvPr/>
+      </p:nvGrpSpPr>
+      <p:grpSpPr>
+        <a:xfrm>
+          <a:off x="0" y="0"/>
+          <a:ext cx="0" cy="0"/>
+          <a:chOff x="0" y="0"/>
+          <a:chExt cx="0" cy="0"/>
+        </a:xfrm>
+      </p:grpSpPr>
+      <p:sp>
+        <p:nvSpPr>
+          <p:cNvPr id="6" name="TextBox 5">
+            <a:extLst>
+              <a:ext uri="{FF2B5EF4-FFF2-40B4-BE49-F238E27FC236}">
+                <a16:creationId xmlns:a16="http://schemas.microsoft.com/office/drawing/2014/main" id="{0D321512-82F9-4087-8D78-818B58162A4F}"/>
+              </a:ext>
+            </a:extLst>
+          </p:cNvPr>
+          <p:cNvSpPr txBox="1"/>
+          <p:nvPr/>
+        </p:nvSpPr>
+        <p:spPr>
+          <a:xfrm>
+            <a:off x="0" y="6477000"/>
+            <a:ext cx="9144000" cy="381000"/>
+          </a:xfrm>
+          <a:prstGeom prst="rect">
+            <a:avLst/>
+          </a:prstGeom>
+          <a:solidFill>
+            <a:schemeClr val="bg2">
+              <a:lumMod val="75000"/>
+            </a:schemeClr>
+          </a:solidFill>
+          <a:ln>
+            <a:solidFill>
+              <a:schemeClr val="accent1"/>
+            </a:solidFill>
+          </a:ln>
+        </p:spPr>
+        <p:txBody>
+          <a:bodyPr wrap="square" rtlCol="0">
+            <a:spAutoFit/>
+          </a:bodyPr>
+          <a:lstStyle/>
+          <a:p>
+            <a:pPr algn="ctr"/>
+            <a:r>
+              <a:rPr lang="en-US" dirty="0"/>
+              <a:t>Department of CSE, KGiSL Institute of Technology, Coimbatore</a:t>
+            </a:r>
+          </a:p>
+        </p:txBody>
+      </p:sp>
+      <p:pic>
+        <p:nvPicPr>
+          <p:cNvPr id="2" name="Picture 1">
+            <a:extLst>
+              <a:ext uri="{FF2B5EF4-FFF2-40B4-BE49-F238E27FC236}">
                 <a16:creationId xmlns:a16="http://schemas.microsoft.com/office/drawing/2014/main" id="{024BD7ED-1AE9-4044-96DE-C783EF4E013D}"/>
               </a:ext>
             </a:extLst>
@@ -9321,7 +10367,7 @@
 </p:sld>
 </file>
 
-<file path=ppt/slides/slide32.xml><?xml version="1.0" encoding="utf-8"?>
+<file path=ppt/slides/slide33.xml><?xml version="1.0" encoding="utf-8"?>
 <p:sld xmlns:a="http://schemas.openxmlformats.org/drawingml/2006/main" xmlns:r="http://schemas.openxmlformats.org/officeDocument/2006/relationships" xmlns:p="http://schemas.openxmlformats.org/presentationml/2006/main">
   <p:cSld>
     <p:spTree>
@@ -9955,6 +11001,130 @@
       </p:grpSpPr>
       <p:sp>
         <p:nvSpPr>
+          <p:cNvPr id="3" name="Content Placeholder 2">
+            <a:extLst>
+              <a:ext uri="{FF2B5EF4-FFF2-40B4-BE49-F238E27FC236}">
+                <a16:creationId xmlns:a16="http://schemas.microsoft.com/office/drawing/2014/main" id="{9435D8E7-5EED-424D-9752-53BB18B58EEC}"/>
+              </a:ext>
+            </a:extLst>
+          </p:cNvPr>
+          <p:cNvSpPr>
+            <a:spLocks noGrp="1"/>
+          </p:cNvSpPr>
+          <p:nvPr>
+            <p:ph idx="1"/>
+          </p:nvPr>
+        </p:nvSpPr>
+        <p:spPr>
+          <a:xfrm>
+            <a:off x="457200" y="990600"/>
+            <a:ext cx="8229600" cy="5562600"/>
+          </a:xfrm>
+        </p:spPr>
+        <p:txBody>
+          <a:bodyPr/>
+          <a:lstStyle/>
+          <a:p>
+            <a:pPr marL="0" indent="0">
+              <a:buNone/>
+            </a:pPr>
+            <a:r>
+              <a:rPr lang="en-US" b="1" dirty="0">
+                <a:latin typeface="Cambria" pitchFamily="18" charset="0"/>
+              </a:rPr>
+              <a:t>future enhancements</a:t>
+            </a:r>
+          </a:p>
+          <a:p>
+            <a:pPr lvl="2">
+              <a:buClrTx/>
+              <a:buFont typeface="Wingdings" pitchFamily="2" charset="2"/>
+              <a:buChar char="§"/>
+            </a:pPr>
+            <a:endParaRPr lang="en-US" dirty="0">
+              <a:latin typeface="Cambria" pitchFamily="18" charset="0"/>
+            </a:endParaRPr>
+          </a:p>
+          <a:p>
+            <a:pPr lvl="2">
+              <a:buClrTx/>
+              <a:buFont typeface="Wingdings" pitchFamily="2" charset="2"/>
+              <a:buChar char="§"/>
+            </a:pPr>
+            <a:r>
+              <a:rPr lang="en-US" dirty="0">
+                <a:latin typeface="Cambria" pitchFamily="18" charset="0"/>
+              </a:rPr>
+              <a:t>This eliminate the process of sending the mails regarding thein complete data (e.g. customer id is missing) to the customer. </a:t>
+            </a:r>
+          </a:p>
+          <a:p>
+            <a:pPr lvl="2">
+              <a:buClrTx/>
+              <a:buFont typeface="Wingdings" pitchFamily="2" charset="2"/>
+              <a:buChar char="§"/>
+            </a:pPr>
+            <a:r>
+              <a:rPr lang="en-US" dirty="0">
+                <a:latin typeface="Cambria" pitchFamily="18" charset="0"/>
+              </a:rPr>
+              <a:t>The system which has this RPA workflow can be considered as a hub system and this hub plays as a role of routing the tickets to the particular persons system(node) according to their domain. This overcomes the process of installation of this workflow in all the system.</a:t>
+            </a:r>
+          </a:p>
+          <a:p>
+            <a:pPr lvl="2">
+              <a:buFont typeface="Wingdings" pitchFamily="2" charset="2"/>
+              <a:buChar char="§"/>
+            </a:pPr>
+            <a:endParaRPr lang="en-US" dirty="0">
+              <a:latin typeface="Cambria" pitchFamily="18" charset="0"/>
+            </a:endParaRPr>
+          </a:p>
+          <a:p>
+            <a:pPr marL="667512" lvl="2" indent="0">
+              <a:buNone/>
+            </a:pPr>
+            <a:endParaRPr lang="en-US" dirty="0">
+              <a:latin typeface="Cambria" pitchFamily="18" charset="0"/>
+            </a:endParaRPr>
+          </a:p>
+          <a:p>
+            <a:endParaRPr lang="en-IN" dirty="0"/>
+          </a:p>
+        </p:txBody>
+      </p:sp>
+    </p:spTree>
+    <p:extLst>
+      <p:ext uri="{BB962C8B-B14F-4D97-AF65-F5344CB8AC3E}">
+        <p14:creationId xmlns:p14="http://schemas.microsoft.com/office/powerpoint/2010/main" val="1587830348"/>
+      </p:ext>
+    </p:extLst>
+  </p:cSld>
+  <p:clrMapOvr>
+    <a:masterClrMapping/>
+  </p:clrMapOvr>
+</p:sld>
+</file>
+
+<file path=ppt/slides/slide7.xml><?xml version="1.0" encoding="utf-8"?>
+<p:sld xmlns:a="http://schemas.openxmlformats.org/drawingml/2006/main" xmlns:r="http://schemas.openxmlformats.org/officeDocument/2006/relationships" xmlns:p="http://schemas.openxmlformats.org/presentationml/2006/main">
+  <p:cSld>
+    <p:spTree>
+      <p:nvGrpSpPr>
+        <p:cNvPr id="1" name=""/>
+        <p:cNvGrpSpPr/>
+        <p:nvPr/>
+      </p:nvGrpSpPr>
+      <p:grpSpPr>
+        <a:xfrm>
+          <a:off x="0" y="0"/>
+          <a:ext cx="0" cy="0"/>
+          <a:chOff x="0" y="0"/>
+          <a:chExt cx="0" cy="0"/>
+        </a:xfrm>
+      </p:grpSpPr>
+      <p:sp>
+        <p:nvSpPr>
           <p:cNvPr id="2" name="Title 1"/>
           <p:cNvSpPr>
             <a:spLocks noGrp="1"/>
@@ -10151,7 +11321,7 @@
 </p:sld>
 </file>
 
-<file path=ppt/slides/slide7.xml><?xml version="1.0" encoding="utf-8"?>
+<file path=ppt/slides/slide8.xml><?xml version="1.0" encoding="utf-8"?>
 <p:sld xmlns:a="http://schemas.openxmlformats.org/drawingml/2006/main" xmlns:r="http://schemas.openxmlformats.org/officeDocument/2006/relationships" xmlns:p="http://schemas.openxmlformats.org/presentationml/2006/main">
   <p:cSld>
     <p:spTree>
@@ -10500,7 +11670,7 @@
 </p:sld>
 </file>
 
-<file path=ppt/slides/slide8.xml><?xml version="1.0" encoding="utf-8"?>
+<file path=ppt/slides/slide9.xml><?xml version="1.0" encoding="utf-8"?>
 <p:sld xmlns:a="http://schemas.openxmlformats.org/drawingml/2006/main" xmlns:r="http://schemas.openxmlformats.org/officeDocument/2006/relationships" xmlns:p="http://schemas.openxmlformats.org/presentationml/2006/main">
   <p:cSld>
     <p:spTree>
@@ -10624,1051 +11794,6 @@
         </p:spPr>
       </p:pic>
     </p:spTree>
-  </p:cSld>
-  <p:clrMapOvr>
-    <a:masterClrMapping/>
-  </p:clrMapOvr>
-</p:sld>
-</file>
-
-<file path=ppt/slides/slide9.xml><?xml version="1.0" encoding="utf-8"?>
-<p:sld xmlns:a="http://schemas.openxmlformats.org/drawingml/2006/main" xmlns:r="http://schemas.openxmlformats.org/officeDocument/2006/relationships" xmlns:p="http://schemas.openxmlformats.org/presentationml/2006/main">
-  <p:cSld>
-    <p:spTree>
-      <p:nvGrpSpPr>
-        <p:cNvPr id="1" name=""/>
-        <p:cNvGrpSpPr/>
-        <p:nvPr/>
-      </p:nvGrpSpPr>
-      <p:grpSpPr>
-        <a:xfrm>
-          <a:off x="0" y="0"/>
-          <a:ext cx="0" cy="0"/>
-          <a:chOff x="0" y="0"/>
-          <a:chExt cx="0" cy="0"/>
-        </a:xfrm>
-      </p:grpSpPr>
-      <p:sp>
-        <p:nvSpPr>
-          <p:cNvPr id="5" name="Rectangle 4">
-            <a:extLst>
-              <a:ext uri="{FF2B5EF4-FFF2-40B4-BE49-F238E27FC236}">
-                <a16:creationId xmlns:a16="http://schemas.microsoft.com/office/drawing/2014/main" id="{B7EF1466-35E1-4A92-9595-5180D18FA1FE}"/>
-              </a:ext>
-            </a:extLst>
-          </p:cNvPr>
-          <p:cNvSpPr/>
-          <p:nvPr/>
-        </p:nvSpPr>
-        <p:spPr>
-          <a:xfrm>
-            <a:off x="1600200" y="863234"/>
-            <a:ext cx="5256584" cy="461663"/>
-          </a:xfrm>
-          <a:prstGeom prst="rect">
-            <a:avLst/>
-          </a:prstGeom>
-          <a:solidFill>
-            <a:srgbClr val="FFFFFF"/>
-          </a:solidFill>
-          <a:ln w="25400" cap="flat">
-            <a:solidFill>
-              <a:schemeClr val="accent1"/>
-            </a:solidFill>
-            <a:prstDash val="solid"/>
-            <a:round/>
-          </a:ln>
-          <a:effectLst>
-            <a:outerShdw blurRad="63500" dist="38100" dir="5400000" rotWithShape="0">
-              <a:srgbClr val="032544">
-                <a:alpha val="48000"/>
-              </a:srgbClr>
-            </a:outerShdw>
-          </a:effectLst>
-          <a:sp3d/>
-        </p:spPr>
-        <p:style>
-          <a:lnRef idx="0">
-            <a:scrgbClr r="0" g="0" b="0"/>
-          </a:lnRef>
-          <a:fillRef idx="0">
-            <a:scrgbClr r="0" g="0" b="0"/>
-          </a:fillRef>
-          <a:effectRef idx="0">
-            <a:scrgbClr r="0" g="0" b="0"/>
-          </a:effectRef>
-          <a:fontRef idx="none"/>
-        </p:style>
-        <p:txBody>
-          <a:bodyPr rot="0" spcFirstLastPara="1" vertOverflow="overflow" horzOverflow="overflow" vert="horz" wrap="square" lIns="45719" tIns="45719" rIns="45719" bIns="45719" numCol="1" spcCol="38100" rtlCol="0" anchor="ctr">
-            <a:spAutoFit/>
-          </a:bodyPr>
-          <a:lstStyle/>
-          <a:p>
-            <a:r>
-              <a:rPr kumimoji="0" lang="en-IN" sz="2400" b="0" i="0" u="none" strike="noStrike" cap="none" spc="0" normalizeH="0" baseline="0" dirty="0">
-                <a:ln>
-                  <a:noFill/>
-                </a:ln>
-                <a:solidFill>
-                  <a:srgbClr val="000000"/>
-                </a:solidFill>
-                <a:effectLst/>
-                <a:uFillTx/>
-                <a:latin typeface="Constantia"/>
-                <a:ea typeface="Constantia"/>
-                <a:cs typeface="Constantia"/>
-                <a:sym typeface="Constantia"/>
-              </a:rPr>
-              <a:t>               Data flow Diagram – Level </a:t>
-            </a:r>
-            <a:r>
-              <a:rPr lang="en-US" sz="2400" dirty="0">
-                <a:latin typeface="Times New Roman" pitchFamily="18" charset="0"/>
-                <a:cs typeface="Times New Roman" pitchFamily="18" charset="0"/>
-              </a:rPr>
-              <a:t>0</a:t>
-            </a:r>
-            <a:endParaRPr kumimoji="0" lang="en-IN" sz="2400" b="0" i="0" u="none" strike="noStrike" cap="none" spc="0" normalizeH="0" baseline="0" dirty="0">
-              <a:ln>
-                <a:noFill/>
-              </a:ln>
-              <a:solidFill>
-                <a:srgbClr val="000000"/>
-              </a:solidFill>
-              <a:effectLst/>
-              <a:uFillTx/>
-              <a:latin typeface="Constantia"/>
-              <a:ea typeface="Constantia"/>
-              <a:cs typeface="Constantia"/>
-              <a:sym typeface="Constantia"/>
-            </a:endParaRPr>
-          </a:p>
-        </p:txBody>
-      </p:sp>
-      <p:sp>
-        <p:nvSpPr>
-          <p:cNvPr id="6" name="Oval 5">
-            <a:extLst>
-              <a:ext uri="{FF2B5EF4-FFF2-40B4-BE49-F238E27FC236}">
-                <a16:creationId xmlns:a16="http://schemas.microsoft.com/office/drawing/2014/main" id="{CC6262A9-06F0-4EBB-8BBD-F697815B0CD3}"/>
-              </a:ext>
-            </a:extLst>
-          </p:cNvPr>
-          <p:cNvSpPr/>
-          <p:nvPr/>
-        </p:nvSpPr>
-        <p:spPr>
-          <a:xfrm>
-            <a:off x="3074351" y="1995686"/>
-            <a:ext cx="1512168" cy="908861"/>
-          </a:xfrm>
-          <a:prstGeom prst="ellipse">
-            <a:avLst/>
-          </a:prstGeom>
-          <a:solidFill>
-            <a:srgbClr val="FFFFFF"/>
-          </a:solidFill>
-          <a:ln w="25400" cap="flat">
-            <a:solidFill>
-              <a:schemeClr val="accent1"/>
-            </a:solidFill>
-            <a:prstDash val="solid"/>
-            <a:round/>
-          </a:ln>
-          <a:effectLst>
-            <a:outerShdw blurRad="63500" dist="38100" dir="5400000" rotWithShape="0">
-              <a:srgbClr val="032544">
-                <a:alpha val="48000"/>
-              </a:srgbClr>
-            </a:outerShdw>
-          </a:effectLst>
-          <a:sp3d/>
-        </p:spPr>
-        <p:style>
-          <a:lnRef idx="0">
-            <a:scrgbClr r="0" g="0" b="0"/>
-          </a:lnRef>
-          <a:fillRef idx="0">
-            <a:scrgbClr r="0" g="0" b="0"/>
-          </a:fillRef>
-          <a:effectRef idx="0">
-            <a:scrgbClr r="0" g="0" b="0"/>
-          </a:effectRef>
-          <a:fontRef idx="none"/>
-        </p:style>
-        <p:txBody>
-          <a:bodyPr rot="0" spcFirstLastPara="1" vertOverflow="overflow" horzOverflow="overflow" vert="horz" wrap="square" lIns="45719" tIns="45719" rIns="45719" bIns="45719" numCol="1" spcCol="38100" rtlCol="0" anchor="ctr">
-            <a:spAutoFit/>
-          </a:bodyPr>
-          <a:lstStyle/>
-          <a:p>
-            <a:pPr marL="0" marR="0" indent="0" algn="l" defTabSz="914400" rtl="0" fontAlgn="auto" latinLnBrk="0" hangingPunct="0">
-              <a:lnSpc>
-                <a:spcPct val="100000"/>
-              </a:lnSpc>
-              <a:spcBef>
-                <a:spcPts val="0"/>
-              </a:spcBef>
-              <a:spcAft>
-                <a:spcPts val="0"/>
-              </a:spcAft>
-              <a:buClrTx/>
-              <a:buSzTx/>
-              <a:buFontTx/>
-              <a:buNone/>
-              <a:tabLst/>
-            </a:pPr>
-            <a:r>
-              <a:rPr lang="en-IN" dirty="0">
-                <a:solidFill>
-                  <a:srgbClr val="000000"/>
-                </a:solidFill>
-                <a:latin typeface="Constantia"/>
-                <a:ea typeface="Constantia"/>
-                <a:cs typeface="Constantia"/>
-                <a:sym typeface="Constantia"/>
-              </a:rPr>
-              <a:t>Raise Tickets</a:t>
-            </a:r>
-            <a:endParaRPr kumimoji="0" lang="en-IN" sz="1800" b="0" i="0" u="none" strike="noStrike" cap="none" spc="0" normalizeH="0" baseline="0" dirty="0">
-              <a:ln>
-                <a:noFill/>
-              </a:ln>
-              <a:solidFill>
-                <a:srgbClr val="000000"/>
-              </a:solidFill>
-              <a:effectLst/>
-              <a:uFillTx/>
-              <a:latin typeface="Constantia"/>
-              <a:ea typeface="Constantia"/>
-              <a:cs typeface="Constantia"/>
-              <a:sym typeface="Constantia"/>
-            </a:endParaRPr>
-          </a:p>
-        </p:txBody>
-      </p:sp>
-      <p:sp>
-        <p:nvSpPr>
-          <p:cNvPr id="7" name="Frame 6">
-            <a:extLst>
-              <a:ext uri="{FF2B5EF4-FFF2-40B4-BE49-F238E27FC236}">
-                <a16:creationId xmlns:a16="http://schemas.microsoft.com/office/drawing/2014/main" id="{DA8D5A8C-DE7E-48C8-9BED-1C44341522AB}"/>
-              </a:ext>
-            </a:extLst>
-          </p:cNvPr>
-          <p:cNvSpPr/>
-          <p:nvPr/>
-        </p:nvSpPr>
-        <p:spPr>
-          <a:xfrm>
-            <a:off x="5742116" y="1946060"/>
-            <a:ext cx="2718316" cy="1008112"/>
-          </a:xfrm>
-          <a:prstGeom prst="frame">
-            <a:avLst/>
-          </a:prstGeom>
-          <a:solidFill>
-            <a:srgbClr val="FFFFFF"/>
-          </a:solidFill>
-          <a:ln w="25400" cap="flat">
-            <a:solidFill>
-              <a:schemeClr val="accent1"/>
-            </a:solidFill>
-            <a:prstDash val="solid"/>
-            <a:round/>
-          </a:ln>
-          <a:effectLst>
-            <a:outerShdw blurRad="63500" dist="38100" dir="5400000" rotWithShape="0">
-              <a:srgbClr val="032544">
-                <a:alpha val="48000"/>
-              </a:srgbClr>
-            </a:outerShdw>
-          </a:effectLst>
-          <a:sp3d/>
-        </p:spPr>
-        <p:style>
-          <a:lnRef idx="0">
-            <a:scrgbClr r="0" g="0" b="0"/>
-          </a:lnRef>
-          <a:fillRef idx="0">
-            <a:scrgbClr r="0" g="0" b="0"/>
-          </a:fillRef>
-          <a:effectRef idx="0">
-            <a:scrgbClr r="0" g="0" b="0"/>
-          </a:effectRef>
-          <a:fontRef idx="none"/>
-        </p:style>
-        <p:txBody>
-          <a:bodyPr rot="0" spcFirstLastPara="1" vertOverflow="overflow" horzOverflow="overflow" vert="horz" wrap="square" lIns="45719" tIns="45719" rIns="45719" bIns="45719" numCol="1" spcCol="38100" rtlCol="0" anchor="ctr">
-            <a:spAutoFit/>
-          </a:bodyPr>
-          <a:lstStyle/>
-          <a:p>
-            <a:pPr marL="0" marR="0" indent="0" algn="l" defTabSz="914400" rtl="0" fontAlgn="auto" latinLnBrk="0" hangingPunct="0">
-              <a:lnSpc>
-                <a:spcPct val="100000"/>
-              </a:lnSpc>
-              <a:spcBef>
-                <a:spcPts val="0"/>
-              </a:spcBef>
-              <a:spcAft>
-                <a:spcPts val="0"/>
-              </a:spcAft>
-              <a:buClrTx/>
-              <a:buSzTx/>
-              <a:buFontTx/>
-              <a:buNone/>
-              <a:tabLst/>
-            </a:pPr>
-            <a:endParaRPr kumimoji="0" lang="en-IN" sz="1800" b="0" i="0" u="none" strike="noStrike" cap="none" spc="0" normalizeH="0" baseline="0" dirty="0">
-              <a:ln>
-                <a:noFill/>
-              </a:ln>
-              <a:solidFill>
-                <a:srgbClr val="000000"/>
-              </a:solidFill>
-              <a:effectLst/>
-              <a:uFillTx/>
-              <a:latin typeface="Constantia"/>
-              <a:ea typeface="Constantia"/>
-              <a:cs typeface="Constantia"/>
-              <a:sym typeface="Constantia"/>
-            </a:endParaRPr>
-          </a:p>
-        </p:txBody>
-      </p:sp>
-      <p:sp>
-        <p:nvSpPr>
-          <p:cNvPr id="8" name="TextBox 7">
-            <a:extLst>
-              <a:ext uri="{FF2B5EF4-FFF2-40B4-BE49-F238E27FC236}">
-                <a16:creationId xmlns:a16="http://schemas.microsoft.com/office/drawing/2014/main" id="{9B4F2905-5123-43F1-8D36-99C15F893979}"/>
-              </a:ext>
-            </a:extLst>
-          </p:cNvPr>
-          <p:cNvSpPr txBox="1"/>
-          <p:nvPr/>
-        </p:nvSpPr>
-        <p:spPr>
-          <a:xfrm>
-            <a:off x="6150213" y="2217422"/>
-            <a:ext cx="1902122" cy="646329"/>
-          </a:xfrm>
-          <a:prstGeom prst="rect">
-            <a:avLst/>
-          </a:prstGeom>
-          <a:noFill/>
-          <a:ln w="12700" cap="flat">
-            <a:noFill/>
-            <a:miter lim="400000"/>
-          </a:ln>
-          <a:effectLst/>
-          <a:sp3d/>
-        </p:spPr>
-        <p:style>
-          <a:lnRef idx="0">
-            <a:scrgbClr r="0" g="0" b="0"/>
-          </a:lnRef>
-          <a:fillRef idx="0">
-            <a:scrgbClr r="0" g="0" b="0"/>
-          </a:fillRef>
-          <a:effectRef idx="0">
-            <a:scrgbClr r="0" g="0" b="0"/>
-          </a:effectRef>
-          <a:fontRef idx="none"/>
-        </p:style>
-        <p:txBody>
-          <a:bodyPr rot="0" spcFirstLastPara="1" vertOverflow="overflow" horzOverflow="overflow" vert="horz" wrap="none" lIns="45719" tIns="45719" rIns="45719" bIns="45719" numCol="1" spcCol="38100" rtlCol="0" anchor="t">
-            <a:spAutoFit/>
-          </a:bodyPr>
-          <a:lstStyle/>
-          <a:p>
-            <a:pPr marL="0" marR="0" indent="0" algn="l" defTabSz="914400" rtl="0" fontAlgn="auto" latinLnBrk="0" hangingPunct="0">
-              <a:lnSpc>
-                <a:spcPct val="100000"/>
-              </a:lnSpc>
-              <a:spcBef>
-                <a:spcPts val="0"/>
-              </a:spcBef>
-              <a:spcAft>
-                <a:spcPts val="0"/>
-              </a:spcAft>
-              <a:buClrTx/>
-              <a:buSzTx/>
-              <a:buFontTx/>
-              <a:buNone/>
-              <a:tabLst/>
-            </a:pPr>
-            <a:r>
-              <a:rPr lang="en-IN" dirty="0"/>
-              <a:t>Notification to </a:t>
-            </a:r>
-          </a:p>
-          <a:p>
-            <a:pPr marL="0" marR="0" indent="0" algn="l" defTabSz="914400" rtl="0" fontAlgn="auto" latinLnBrk="0" hangingPunct="0">
-              <a:lnSpc>
-                <a:spcPct val="100000"/>
-              </a:lnSpc>
-              <a:spcBef>
-                <a:spcPts val="0"/>
-              </a:spcBef>
-              <a:spcAft>
-                <a:spcPts val="0"/>
-              </a:spcAft>
-              <a:buClrTx/>
-              <a:buSzTx/>
-              <a:buFontTx/>
-              <a:buNone/>
-              <a:tabLst/>
-            </a:pPr>
-            <a:r>
-              <a:rPr lang="en-IN" dirty="0"/>
-              <a:t>authorised person</a:t>
-            </a:r>
-            <a:endParaRPr kumimoji="0" lang="en-IN" sz="1800" b="0" i="0" u="none" strike="noStrike" cap="none" spc="0" normalizeH="0" baseline="0" dirty="0">
-              <a:ln>
-                <a:noFill/>
-              </a:ln>
-              <a:solidFill>
-                <a:srgbClr val="000000"/>
-              </a:solidFill>
-              <a:effectLst/>
-              <a:uFillTx/>
-              <a:latin typeface="Constantia"/>
-              <a:ea typeface="Constantia"/>
-              <a:cs typeface="Constantia"/>
-              <a:sym typeface="Constantia"/>
-            </a:endParaRPr>
-          </a:p>
-        </p:txBody>
-      </p:sp>
-      <p:cxnSp>
-        <p:nvCxnSpPr>
-          <p:cNvPr id="9" name="Straight Arrow Connector 8">
-            <a:extLst>
-              <a:ext uri="{FF2B5EF4-FFF2-40B4-BE49-F238E27FC236}">
-                <a16:creationId xmlns:a16="http://schemas.microsoft.com/office/drawing/2014/main" id="{7BD4BBBD-8479-4C08-9E17-C9EFE4699349}"/>
-              </a:ext>
-            </a:extLst>
-          </p:cNvPr>
-          <p:cNvCxnSpPr>
-            <a:endCxn id="6" idx="2"/>
-          </p:cNvCxnSpPr>
-          <p:nvPr/>
-        </p:nvCxnSpPr>
-        <p:spPr>
-          <a:xfrm>
-            <a:off x="1918754" y="2450116"/>
-            <a:ext cx="1155597" cy="1"/>
-          </a:xfrm>
-          <a:prstGeom prst="straightConnector1">
-            <a:avLst/>
-          </a:prstGeom>
-          <a:noFill/>
-          <a:ln w="25400" cap="flat">
-            <a:solidFill>
-              <a:schemeClr val="accent1"/>
-            </a:solidFill>
-            <a:prstDash val="solid"/>
-            <a:round/>
-            <a:tailEnd type="triangle"/>
-          </a:ln>
-          <a:effectLst>
-            <a:outerShdw blurRad="63500" dist="38100" dir="5400000" rotWithShape="0">
-              <a:srgbClr val="032544">
-                <a:alpha val="48000"/>
-              </a:srgbClr>
-            </a:outerShdw>
-          </a:effectLst>
-          <a:sp3d/>
-        </p:spPr>
-        <p:style>
-          <a:lnRef idx="0">
-            <a:scrgbClr r="0" g="0" b="0"/>
-          </a:lnRef>
-          <a:fillRef idx="0">
-            <a:scrgbClr r="0" g="0" b="0"/>
-          </a:fillRef>
-          <a:effectRef idx="0">
-            <a:scrgbClr r="0" g="0" b="0"/>
-          </a:effectRef>
-          <a:fontRef idx="none"/>
-        </p:style>
-      </p:cxnSp>
-      <p:cxnSp>
-        <p:nvCxnSpPr>
-          <p:cNvPr id="10" name="Straight Arrow Connector 9">
-            <a:extLst>
-              <a:ext uri="{FF2B5EF4-FFF2-40B4-BE49-F238E27FC236}">
-                <a16:creationId xmlns:a16="http://schemas.microsoft.com/office/drawing/2014/main" id="{D0D6361A-53C2-4820-A7BB-8CF6073E78D6}"/>
-              </a:ext>
-            </a:extLst>
-          </p:cNvPr>
-          <p:cNvCxnSpPr>
-            <a:stCxn id="6" idx="6"/>
-            <a:endCxn id="7" idx="1"/>
-          </p:cNvCxnSpPr>
-          <p:nvPr/>
-        </p:nvCxnSpPr>
-        <p:spPr>
-          <a:xfrm flipV="1">
-            <a:off x="4586519" y="2450116"/>
-            <a:ext cx="1155597" cy="1"/>
-          </a:xfrm>
-          <a:prstGeom prst="straightConnector1">
-            <a:avLst/>
-          </a:prstGeom>
-          <a:noFill/>
-          <a:ln w="25400" cap="flat">
-            <a:solidFill>
-              <a:schemeClr val="accent1"/>
-            </a:solidFill>
-            <a:prstDash val="solid"/>
-            <a:round/>
-            <a:tailEnd type="triangle"/>
-          </a:ln>
-          <a:effectLst>
-            <a:outerShdw blurRad="63500" dist="38100" dir="5400000" rotWithShape="0">
-              <a:srgbClr val="032544">
-                <a:alpha val="48000"/>
-              </a:srgbClr>
-            </a:outerShdw>
-          </a:effectLst>
-          <a:sp3d/>
-        </p:spPr>
-        <p:style>
-          <a:lnRef idx="0">
-            <a:scrgbClr r="0" g="0" b="0"/>
-          </a:lnRef>
-          <a:fillRef idx="0">
-            <a:scrgbClr r="0" g="0" b="0"/>
-          </a:fillRef>
-          <a:effectRef idx="0">
-            <a:scrgbClr r="0" g="0" b="0"/>
-          </a:effectRef>
-          <a:fontRef idx="none"/>
-        </p:style>
-      </p:cxnSp>
-      <p:cxnSp>
-        <p:nvCxnSpPr>
-          <p:cNvPr id="11" name="Straight Connector 10">
-            <a:extLst>
-              <a:ext uri="{FF2B5EF4-FFF2-40B4-BE49-F238E27FC236}">
-                <a16:creationId xmlns:a16="http://schemas.microsoft.com/office/drawing/2014/main" id="{E09A28BB-C2AE-4DEE-A8E4-3F57A33C4261}"/>
-              </a:ext>
-            </a:extLst>
-          </p:cNvPr>
-          <p:cNvCxnSpPr/>
-          <p:nvPr/>
-        </p:nvCxnSpPr>
-        <p:spPr>
-          <a:xfrm>
-            <a:off x="2987824" y="4227934"/>
-            <a:ext cx="0" cy="576064"/>
-          </a:xfrm>
-          <a:prstGeom prst="line">
-            <a:avLst/>
-          </a:prstGeom>
-          <a:noFill/>
-          <a:ln w="25400" cap="flat">
-            <a:solidFill>
-              <a:schemeClr val="accent1"/>
-            </a:solidFill>
-            <a:prstDash val="solid"/>
-            <a:round/>
-          </a:ln>
-          <a:effectLst>
-            <a:outerShdw blurRad="63500" dist="38100" dir="5400000" rotWithShape="0">
-              <a:srgbClr val="032544">
-                <a:alpha val="48000"/>
-              </a:srgbClr>
-            </a:outerShdw>
-          </a:effectLst>
-          <a:sp3d/>
-        </p:spPr>
-        <p:style>
-          <a:lnRef idx="0">
-            <a:scrgbClr r="0" g="0" b="0"/>
-          </a:lnRef>
-          <a:fillRef idx="0">
-            <a:scrgbClr r="0" g="0" b="0"/>
-          </a:fillRef>
-          <a:effectRef idx="0">
-            <a:scrgbClr r="0" g="0" b="0"/>
-          </a:effectRef>
-          <a:fontRef idx="none"/>
-        </p:style>
-      </p:cxnSp>
-      <p:cxnSp>
-        <p:nvCxnSpPr>
-          <p:cNvPr id="12" name="Straight Connector 11">
-            <a:extLst>
-              <a:ext uri="{FF2B5EF4-FFF2-40B4-BE49-F238E27FC236}">
-                <a16:creationId xmlns:a16="http://schemas.microsoft.com/office/drawing/2014/main" id="{38ED5334-CB21-4560-8570-D27251454850}"/>
-              </a:ext>
-            </a:extLst>
-          </p:cNvPr>
-          <p:cNvCxnSpPr>
-            <a:cxnSpLocks/>
-          </p:cNvCxnSpPr>
-          <p:nvPr/>
-        </p:nvCxnSpPr>
-        <p:spPr>
-          <a:xfrm>
-            <a:off x="2987824" y="4227934"/>
-            <a:ext cx="2193776" cy="0"/>
-          </a:xfrm>
-          <a:prstGeom prst="line">
-            <a:avLst/>
-          </a:prstGeom>
-          <a:noFill/>
-          <a:ln w="25400" cap="flat">
-            <a:solidFill>
-              <a:schemeClr val="accent1"/>
-            </a:solidFill>
-            <a:prstDash val="solid"/>
-            <a:round/>
-          </a:ln>
-          <a:effectLst>
-            <a:outerShdw blurRad="63500" dist="38100" dir="5400000" rotWithShape="0">
-              <a:srgbClr val="032544">
-                <a:alpha val="48000"/>
-              </a:srgbClr>
-            </a:outerShdw>
-          </a:effectLst>
-          <a:sp3d/>
-        </p:spPr>
-        <p:style>
-          <a:lnRef idx="0">
-            <a:scrgbClr r="0" g="0" b="0"/>
-          </a:lnRef>
-          <a:fillRef idx="0">
-            <a:scrgbClr r="0" g="0" b="0"/>
-          </a:fillRef>
-          <a:effectRef idx="0">
-            <a:scrgbClr r="0" g="0" b="0"/>
-          </a:effectRef>
-          <a:fontRef idx="none"/>
-        </p:style>
-      </p:cxnSp>
-      <p:cxnSp>
-        <p:nvCxnSpPr>
-          <p:cNvPr id="13" name="Straight Connector 12">
-            <a:extLst>
-              <a:ext uri="{FF2B5EF4-FFF2-40B4-BE49-F238E27FC236}">
-                <a16:creationId xmlns:a16="http://schemas.microsoft.com/office/drawing/2014/main" id="{2B272F0D-D553-4AC0-AA85-F9F1622EA84D}"/>
-              </a:ext>
-            </a:extLst>
-          </p:cNvPr>
-          <p:cNvCxnSpPr>
-            <a:cxnSpLocks/>
-          </p:cNvCxnSpPr>
-          <p:nvPr/>
-        </p:nvCxnSpPr>
-        <p:spPr>
-          <a:xfrm>
-            <a:off x="2987824" y="4803998"/>
-            <a:ext cx="2193776" cy="0"/>
-          </a:xfrm>
-          <a:prstGeom prst="line">
-            <a:avLst/>
-          </a:prstGeom>
-          <a:noFill/>
-          <a:ln w="25400" cap="flat">
-            <a:solidFill>
-              <a:schemeClr val="accent1"/>
-            </a:solidFill>
-            <a:prstDash val="solid"/>
-            <a:round/>
-          </a:ln>
-          <a:effectLst>
-            <a:outerShdw blurRad="63500" dist="38100" dir="5400000" rotWithShape="0">
-              <a:srgbClr val="032544">
-                <a:alpha val="48000"/>
-              </a:srgbClr>
-            </a:outerShdw>
-          </a:effectLst>
-          <a:sp3d/>
-        </p:spPr>
-        <p:style>
-          <a:lnRef idx="0">
-            <a:scrgbClr r="0" g="0" b="0"/>
-          </a:lnRef>
-          <a:fillRef idx="0">
-            <a:scrgbClr r="0" g="0" b="0"/>
-          </a:fillRef>
-          <a:effectRef idx="0">
-            <a:scrgbClr r="0" g="0" b="0"/>
-          </a:effectRef>
-          <a:fontRef idx="none"/>
-        </p:style>
-      </p:cxnSp>
-      <p:sp>
-        <p:nvSpPr>
-          <p:cNvPr id="14" name="TextBox 13">
-            <a:extLst>
-              <a:ext uri="{FF2B5EF4-FFF2-40B4-BE49-F238E27FC236}">
-                <a16:creationId xmlns:a16="http://schemas.microsoft.com/office/drawing/2014/main" id="{BC82F786-D26F-4E9D-BB91-99BA0AECD405}"/>
-              </a:ext>
-            </a:extLst>
-          </p:cNvPr>
-          <p:cNvSpPr txBox="1"/>
-          <p:nvPr/>
-        </p:nvSpPr>
-        <p:spPr>
-          <a:xfrm>
-            <a:off x="3275856" y="4371950"/>
-            <a:ext cx="1944313" cy="369330"/>
-          </a:xfrm>
-          <a:prstGeom prst="rect">
-            <a:avLst/>
-          </a:prstGeom>
-          <a:noFill/>
-          <a:ln w="12700" cap="flat">
-            <a:noFill/>
-            <a:miter lim="400000"/>
-          </a:ln>
-          <a:effectLst/>
-          <a:sp3d/>
-        </p:spPr>
-        <p:style>
-          <a:lnRef idx="0">
-            <a:scrgbClr r="0" g="0" b="0"/>
-          </a:lnRef>
-          <a:fillRef idx="0">
-            <a:scrgbClr r="0" g="0" b="0"/>
-          </a:fillRef>
-          <a:effectRef idx="0">
-            <a:scrgbClr r="0" g="0" b="0"/>
-          </a:effectRef>
-          <a:fontRef idx="none"/>
-        </p:style>
-        <p:txBody>
-          <a:bodyPr rot="0" spcFirstLastPara="1" vertOverflow="overflow" horzOverflow="overflow" vert="horz" wrap="none" lIns="45719" tIns="45719" rIns="45719" bIns="45719" numCol="1" spcCol="38100" rtlCol="0" anchor="t">
-            <a:spAutoFit/>
-          </a:bodyPr>
-          <a:lstStyle/>
-          <a:p>
-            <a:pPr marL="0" marR="0" indent="0" algn="l" defTabSz="914400" rtl="0" fontAlgn="auto" latinLnBrk="0" hangingPunct="0">
-              <a:lnSpc>
-                <a:spcPct val="100000"/>
-              </a:lnSpc>
-              <a:spcBef>
-                <a:spcPts val="0"/>
-              </a:spcBef>
-              <a:spcAft>
-                <a:spcPts val="0"/>
-              </a:spcAft>
-              <a:buClrTx/>
-              <a:buSzTx/>
-              <a:buFontTx/>
-              <a:buNone/>
-              <a:tabLst/>
-            </a:pPr>
-            <a:r>
-              <a:rPr kumimoji="0" lang="en-IN" sz="1800" b="0" i="0" u="none" strike="noStrike" cap="none" spc="0" normalizeH="0" baseline="0" dirty="0">
-                <a:ln>
-                  <a:noFill/>
-                </a:ln>
-                <a:solidFill>
-                  <a:srgbClr val="000000"/>
-                </a:solidFill>
-                <a:effectLst/>
-                <a:uFillTx/>
-                <a:latin typeface="Constantia"/>
-                <a:ea typeface="Constantia"/>
-                <a:cs typeface="Constantia"/>
-                <a:sym typeface="Constantia"/>
-              </a:rPr>
-              <a:t>Keyword Database</a:t>
-            </a:r>
-          </a:p>
-        </p:txBody>
-      </p:sp>
-      <p:cxnSp>
-        <p:nvCxnSpPr>
-          <p:cNvPr id="15" name="Straight Arrow Connector 14">
-            <a:extLst>
-              <a:ext uri="{FF2B5EF4-FFF2-40B4-BE49-F238E27FC236}">
-                <a16:creationId xmlns:a16="http://schemas.microsoft.com/office/drawing/2014/main" id="{200984AF-C21C-4593-B087-1EEAC6F78692}"/>
-              </a:ext>
-            </a:extLst>
-          </p:cNvPr>
-          <p:cNvCxnSpPr/>
-          <p:nvPr/>
-        </p:nvCxnSpPr>
-        <p:spPr>
-          <a:xfrm>
-            <a:off x="1378694" y="2954172"/>
-            <a:ext cx="1609130" cy="1602443"/>
-          </a:xfrm>
-          <a:prstGeom prst="straightConnector1">
-            <a:avLst/>
-          </a:prstGeom>
-          <a:noFill/>
-          <a:ln w="25400" cap="flat">
-            <a:solidFill>
-              <a:schemeClr val="accent1"/>
-            </a:solidFill>
-            <a:prstDash val="solid"/>
-            <a:round/>
-            <a:tailEnd type="triangle"/>
-          </a:ln>
-          <a:effectLst>
-            <a:outerShdw blurRad="63500" dist="38100" dir="5400000" rotWithShape="0">
-              <a:srgbClr val="032544">
-                <a:alpha val="48000"/>
-              </a:srgbClr>
-            </a:outerShdw>
-          </a:effectLst>
-          <a:sp3d/>
-        </p:spPr>
-        <p:style>
-          <a:lnRef idx="0">
-            <a:scrgbClr r="0" g="0" b="0"/>
-          </a:lnRef>
-          <a:fillRef idx="0">
-            <a:scrgbClr r="0" g="0" b="0"/>
-          </a:fillRef>
-          <a:effectRef idx="0">
-            <a:scrgbClr r="0" g="0" b="0"/>
-          </a:effectRef>
-          <a:fontRef idx="none"/>
-        </p:style>
-      </p:cxnSp>
-      <p:cxnSp>
-        <p:nvCxnSpPr>
-          <p:cNvPr id="16" name="Straight Arrow Connector 15">
-            <a:extLst>
-              <a:ext uri="{FF2B5EF4-FFF2-40B4-BE49-F238E27FC236}">
-                <a16:creationId xmlns:a16="http://schemas.microsoft.com/office/drawing/2014/main" id="{DD29FB4D-BFC6-4F44-BB95-EAD3733DD8F8}"/>
-              </a:ext>
-            </a:extLst>
-          </p:cNvPr>
-          <p:cNvCxnSpPr>
-            <a:endCxn id="6" idx="4"/>
-          </p:cNvCxnSpPr>
-          <p:nvPr/>
-        </p:nvCxnSpPr>
-        <p:spPr>
-          <a:xfrm flipV="1">
-            <a:off x="3830435" y="2904547"/>
-            <a:ext cx="0" cy="1323389"/>
-          </a:xfrm>
-          <a:prstGeom prst="straightConnector1">
-            <a:avLst/>
-          </a:prstGeom>
-          <a:noFill/>
-          <a:ln w="25400" cap="flat">
-            <a:solidFill>
-              <a:schemeClr val="accent1"/>
-            </a:solidFill>
-            <a:prstDash val="solid"/>
-            <a:round/>
-            <a:tailEnd type="triangle"/>
-          </a:ln>
-          <a:effectLst>
-            <a:outerShdw blurRad="63500" dist="38100" dir="5400000" rotWithShape="0">
-              <a:srgbClr val="032544">
-                <a:alpha val="48000"/>
-              </a:srgbClr>
-            </a:outerShdw>
-          </a:effectLst>
-          <a:sp3d/>
-        </p:spPr>
-        <p:style>
-          <a:lnRef idx="0">
-            <a:scrgbClr r="0" g="0" b="0"/>
-          </a:lnRef>
-          <a:fillRef idx="0">
-            <a:scrgbClr r="0" g="0" b="0"/>
-          </a:fillRef>
-          <a:effectRef idx="0">
-            <a:scrgbClr r="0" g="0" b="0"/>
-          </a:effectRef>
-          <a:fontRef idx="none"/>
-        </p:style>
-      </p:cxnSp>
-      <p:sp>
-        <p:nvSpPr>
-          <p:cNvPr id="17" name="Frame 16">
-            <a:extLst>
-              <a:ext uri="{FF2B5EF4-FFF2-40B4-BE49-F238E27FC236}">
-                <a16:creationId xmlns:a16="http://schemas.microsoft.com/office/drawing/2014/main" id="{7CDE5C7C-F863-4E77-915A-559F3A29680C}"/>
-              </a:ext>
-            </a:extLst>
-          </p:cNvPr>
-          <p:cNvSpPr/>
-          <p:nvPr/>
-        </p:nvSpPr>
-        <p:spPr>
-          <a:xfrm>
-            <a:off x="838634" y="1946060"/>
-            <a:ext cx="1080120" cy="1008112"/>
-          </a:xfrm>
-          <a:prstGeom prst="frame">
-            <a:avLst/>
-          </a:prstGeom>
-          <a:solidFill>
-            <a:srgbClr val="FFFFFF"/>
-          </a:solidFill>
-          <a:ln w="25400" cap="flat">
-            <a:solidFill>
-              <a:schemeClr val="accent1"/>
-            </a:solidFill>
-            <a:prstDash val="solid"/>
-            <a:round/>
-          </a:ln>
-          <a:effectLst>
-            <a:outerShdw blurRad="63500" dist="38100" dir="5400000" rotWithShape="0">
-              <a:srgbClr val="032544">
-                <a:alpha val="48000"/>
-              </a:srgbClr>
-            </a:outerShdw>
-          </a:effectLst>
-          <a:sp3d/>
-        </p:spPr>
-        <p:style>
-          <a:lnRef idx="0">
-            <a:scrgbClr r="0" g="0" b="0"/>
-          </a:lnRef>
-          <a:fillRef idx="0">
-            <a:scrgbClr r="0" g="0" b="0"/>
-          </a:fillRef>
-          <a:effectRef idx="0">
-            <a:scrgbClr r="0" g="0" b="0"/>
-          </a:effectRef>
-          <a:fontRef idx="none"/>
-        </p:style>
-        <p:txBody>
-          <a:bodyPr rot="0" spcFirstLastPara="1" vertOverflow="overflow" horzOverflow="overflow" vert="horz" wrap="square" lIns="45719" tIns="45719" rIns="45719" bIns="45719" numCol="1" spcCol="38100" rtlCol="0" anchor="ctr">
-            <a:spAutoFit/>
-          </a:bodyPr>
-          <a:lstStyle/>
-          <a:p>
-            <a:pPr marL="0" marR="0" indent="0" algn="l" defTabSz="914400" rtl="0" fontAlgn="auto" latinLnBrk="0" hangingPunct="0">
-              <a:lnSpc>
-                <a:spcPct val="100000"/>
-              </a:lnSpc>
-              <a:spcBef>
-                <a:spcPts val="0"/>
-              </a:spcBef>
-              <a:spcAft>
-                <a:spcPts val="0"/>
-              </a:spcAft>
-              <a:buClrTx/>
-              <a:buSzTx/>
-              <a:buFontTx/>
-              <a:buNone/>
-              <a:tabLst/>
-            </a:pPr>
-            <a:endParaRPr kumimoji="0" lang="en-IN" sz="1800" b="0" i="0" u="none" strike="noStrike" cap="none" spc="0" normalizeH="0" baseline="0">
-              <a:ln>
-                <a:noFill/>
-              </a:ln>
-              <a:solidFill>
-                <a:srgbClr val="000000"/>
-              </a:solidFill>
-              <a:effectLst/>
-              <a:uFillTx/>
-              <a:latin typeface="Constantia"/>
-              <a:ea typeface="Constantia"/>
-              <a:cs typeface="Constantia"/>
-              <a:sym typeface="Constantia"/>
-            </a:endParaRPr>
-          </a:p>
-        </p:txBody>
-      </p:sp>
-      <p:sp>
-        <p:nvSpPr>
-          <p:cNvPr id="18" name="TextBox 17">
-            <a:extLst>
-              <a:ext uri="{FF2B5EF4-FFF2-40B4-BE49-F238E27FC236}">
-                <a16:creationId xmlns:a16="http://schemas.microsoft.com/office/drawing/2014/main" id="{4894E485-08DC-494C-B0C7-B00ADA0BBF31}"/>
-              </a:ext>
-            </a:extLst>
-          </p:cNvPr>
-          <p:cNvSpPr txBox="1"/>
-          <p:nvPr/>
-        </p:nvSpPr>
-        <p:spPr>
-          <a:xfrm>
-            <a:off x="1007604" y="2355921"/>
-            <a:ext cx="720080" cy="369330"/>
-          </a:xfrm>
-          <a:prstGeom prst="rect">
-            <a:avLst/>
-          </a:prstGeom>
-          <a:noFill/>
-          <a:ln w="12700" cap="flat">
-            <a:noFill/>
-            <a:miter lim="400000"/>
-          </a:ln>
-          <a:effectLst/>
-          <a:sp3d/>
-        </p:spPr>
-        <p:style>
-          <a:lnRef idx="0">
-            <a:scrgbClr r="0" g="0" b="0"/>
-          </a:lnRef>
-          <a:fillRef idx="0">
-            <a:scrgbClr r="0" g="0" b="0"/>
-          </a:fillRef>
-          <a:effectRef idx="0">
-            <a:scrgbClr r="0" g="0" b="0"/>
-          </a:effectRef>
-          <a:fontRef idx="none"/>
-        </p:style>
-        <p:txBody>
-          <a:bodyPr rot="0" spcFirstLastPara="1" vertOverflow="overflow" horzOverflow="overflow" vert="horz" wrap="square" lIns="45719" tIns="45719" rIns="45719" bIns="45719" numCol="1" spcCol="38100" rtlCol="0" anchor="t">
-            <a:spAutoFit/>
-          </a:bodyPr>
-          <a:lstStyle/>
-          <a:p>
-            <a:pPr marL="0" marR="0" indent="0" algn="l" defTabSz="914400" rtl="0" fontAlgn="auto" latinLnBrk="0" hangingPunct="0">
-              <a:lnSpc>
-                <a:spcPct val="100000"/>
-              </a:lnSpc>
-              <a:spcBef>
-                <a:spcPts val="0"/>
-              </a:spcBef>
-              <a:spcAft>
-                <a:spcPts val="0"/>
-              </a:spcAft>
-              <a:buClrTx/>
-              <a:buSzTx/>
-              <a:buFontTx/>
-              <a:buNone/>
-              <a:tabLst/>
-            </a:pPr>
-            <a:r>
-              <a:rPr lang="en-IN" dirty="0"/>
-              <a:t>User</a:t>
-            </a:r>
-            <a:endParaRPr kumimoji="0" lang="en-IN" sz="1800" b="0" i="0" u="none" strike="noStrike" cap="none" spc="0" normalizeH="0" baseline="0" dirty="0">
-              <a:ln>
-                <a:noFill/>
-              </a:ln>
-              <a:solidFill>
-                <a:srgbClr val="000000"/>
-              </a:solidFill>
-              <a:effectLst/>
-              <a:uFillTx/>
-              <a:latin typeface="Constantia"/>
-              <a:ea typeface="Constantia"/>
-              <a:cs typeface="Constantia"/>
-              <a:sym typeface="Constantia"/>
-            </a:endParaRPr>
-          </a:p>
-        </p:txBody>
-      </p:sp>
-    </p:spTree>
-    <p:extLst>
-      <p:ext uri="{BB962C8B-B14F-4D97-AF65-F5344CB8AC3E}">
-        <p14:creationId xmlns:p14="http://schemas.microsoft.com/office/powerpoint/2010/main" val="719056927"/>
-      </p:ext>
-    </p:extLst>
   </p:cSld>
   <p:clrMapOvr>
     <a:masterClrMapping/>

</xml_diff>

<commit_message>
Added the Final Documents with Updated Final PPT, and test run the Project
</commit_message>
<xml_diff>
--- a/Ticket_Automation/WS/Docs/PPT/final_review_template.pptx
+++ b/Ticket_Automation/WS/Docs/PPT/final_review_template.pptx
@@ -253,7 +253,7 @@
             <a:fld id="{D0B3AD4F-333B-4FA6-A95A-8834EE455EFF}" type="datetimeFigureOut">
               <a:rPr lang="en-US" smtClean="0"/>
               <a:pPr/>
-              <a:t>6/8/2020</a:t>
+              <a:t>9/17/2020</a:t>
             </a:fld>
             <a:endParaRPr lang="en-US"/>
           </a:p>
@@ -695,7 +695,7 @@
             <a:fld id="{3D82AAB8-209E-40E4-9B0A-72170986B060}" type="datetimeFigureOut">
               <a:rPr lang="en-US" smtClean="0"/>
               <a:pPr/>
-              <a:t>6/8/2020</a:t>
+              <a:t>9/17/2020</a:t>
             </a:fld>
             <a:endParaRPr lang="en-US"/>
           </a:p>
@@ -861,7 +861,7 @@
             <a:fld id="{3D82AAB8-209E-40E4-9B0A-72170986B060}" type="datetimeFigureOut">
               <a:rPr lang="en-US" smtClean="0"/>
               <a:pPr/>
-              <a:t>6/8/2020</a:t>
+              <a:t>9/17/2020</a:t>
             </a:fld>
             <a:endParaRPr lang="en-US"/>
           </a:p>
@@ -1037,7 +1037,7 @@
             <a:fld id="{3D82AAB8-209E-40E4-9B0A-72170986B060}" type="datetimeFigureOut">
               <a:rPr lang="en-US" smtClean="0"/>
               <a:pPr/>
-              <a:t>6/8/2020</a:t>
+              <a:t>9/17/2020</a:t>
             </a:fld>
             <a:endParaRPr lang="en-US"/>
           </a:p>
@@ -1203,7 +1203,7 @@
             <a:fld id="{3D82AAB8-209E-40E4-9B0A-72170986B060}" type="datetimeFigureOut">
               <a:rPr lang="en-US" smtClean="0"/>
               <a:pPr/>
-              <a:t>6/8/2020</a:t>
+              <a:t>9/17/2020</a:t>
             </a:fld>
             <a:endParaRPr lang="en-US"/>
           </a:p>
@@ -1446,7 +1446,7 @@
             <a:fld id="{3D82AAB8-209E-40E4-9B0A-72170986B060}" type="datetimeFigureOut">
               <a:rPr lang="en-US" smtClean="0"/>
               <a:pPr/>
-              <a:t>6/8/2020</a:t>
+              <a:t>9/17/2020</a:t>
             </a:fld>
             <a:endParaRPr lang="en-US"/>
           </a:p>
@@ -1711,7 +1711,7 @@
             <a:fld id="{3D82AAB8-209E-40E4-9B0A-72170986B060}" type="datetimeFigureOut">
               <a:rPr lang="en-US" smtClean="0"/>
               <a:pPr/>
-              <a:t>6/8/2020</a:t>
+              <a:t>9/17/2020</a:t>
             </a:fld>
             <a:endParaRPr lang="en-US"/>
           </a:p>
@@ -2090,7 +2090,7 @@
             <a:fld id="{3D82AAB8-209E-40E4-9B0A-72170986B060}" type="datetimeFigureOut">
               <a:rPr lang="en-US" smtClean="0"/>
               <a:pPr/>
-              <a:t>6/8/2020</a:t>
+              <a:t>9/17/2020</a:t>
             </a:fld>
             <a:endParaRPr lang="en-US"/>
           </a:p>
@@ -2241,7 +2241,7 @@
             <a:fld id="{3D82AAB8-209E-40E4-9B0A-72170986B060}" type="datetimeFigureOut">
               <a:rPr lang="en-US" smtClean="0"/>
               <a:pPr/>
-              <a:t>6/8/2020</a:t>
+              <a:t>9/17/2020</a:t>
             </a:fld>
             <a:endParaRPr lang="en-US"/>
           </a:p>
@@ -2333,7 +2333,7 @@
             <a:fld id="{3D82AAB8-209E-40E4-9B0A-72170986B060}" type="datetimeFigureOut">
               <a:rPr lang="en-US" smtClean="0"/>
               <a:pPr/>
-              <a:t>6/8/2020</a:t>
+              <a:t>9/17/2020</a:t>
             </a:fld>
             <a:endParaRPr lang="en-US"/>
           </a:p>
@@ -2595,7 +2595,7 @@
             <a:fld id="{3D82AAB8-209E-40E4-9B0A-72170986B060}" type="datetimeFigureOut">
               <a:rPr lang="en-US" smtClean="0"/>
               <a:pPr/>
-              <a:t>6/8/2020</a:t>
+              <a:t>9/17/2020</a:t>
             </a:fld>
             <a:endParaRPr lang="en-US"/>
           </a:p>
@@ -2884,7 +2884,7 @@
             <a:fld id="{3D82AAB8-209E-40E4-9B0A-72170986B060}" type="datetimeFigureOut">
               <a:rPr lang="en-US" smtClean="0"/>
               <a:pPr/>
-              <a:t>6/8/2020</a:t>
+              <a:t>9/17/2020</a:t>
             </a:fld>
             <a:endParaRPr lang="en-US"/>
           </a:p>
@@ -3655,7 +3655,7 @@
             <a:fld id="{3D82AAB8-209E-40E4-9B0A-72170986B060}" type="datetimeFigureOut">
               <a:rPr lang="en-US" smtClean="0"/>
               <a:pPr/>
-              <a:t>6/8/2020</a:t>
+              <a:t>9/17/2020</a:t>
             </a:fld>
             <a:endParaRPr lang="en-US"/>
           </a:p>
@@ -4298,47 +4298,42 @@
           <a:p>
             <a:pPr algn="ctr"/>
             <a:r>
-              <a:rPr lang="en-US" sz="3200" dirty="0">
+              <a:rPr lang="en-US" sz="4000" dirty="0">
                 <a:solidFill>
                   <a:schemeClr val="tx1"/>
                 </a:solidFill>
-                <a:latin typeface="Cambria" pitchFamily="18" charset="0"/>
               </a:rPr>
               <a:t>Customer Support </a:t>
             </a:r>
             <a:r>
-              <a:rPr lang="en-US" sz="3200" b="0" dirty="0">
+              <a:rPr lang="en-US" sz="4000" b="0" dirty="0">
                 <a:solidFill>
                   <a:schemeClr val="tx1"/>
                 </a:solidFill>
-                <a:latin typeface="Cambria" pitchFamily="18" charset="0"/>
               </a:rPr>
               <a:t>–</a:t>
             </a:r>
             <a:r>
-              <a:rPr lang="en-US" sz="3200" dirty="0">
+              <a:rPr lang="en-US" sz="4000" dirty="0">
                 <a:solidFill>
                   <a:schemeClr val="tx1"/>
                 </a:solidFill>
-                <a:latin typeface="Cambria" pitchFamily="18" charset="0"/>
               </a:rPr>
               <a:t> </a:t>
             </a:r>
             <a:r>
-              <a:rPr lang="en-US" sz="3200" b="0" i="1" dirty="0">
+              <a:rPr lang="en-US" sz="4000" b="0" i="1" dirty="0">
                 <a:solidFill>
                   <a:schemeClr val="tx1"/>
                 </a:solidFill>
-                <a:latin typeface="Cambria" pitchFamily="18" charset="0"/>
               </a:rPr>
               <a:t>Automation of ticket creation and response based on the mail </a:t>
             </a:r>
             <a:r>
-              <a:rPr lang="en-US" sz="3200" dirty="0">
+              <a:rPr lang="en-US" sz="4000" dirty="0">
                 <a:solidFill>
                   <a:schemeClr val="tx1"/>
                 </a:solidFill>
-                <a:latin typeface="Cambria" pitchFamily="18" charset="0"/>
               </a:rPr>
               <a:t>(RPA)</a:t>
             </a:r>
@@ -7188,11 +7183,13 @@
           </a:xfrm>
         </p:spPr>
         <p:txBody>
-          <a:bodyPr/>
-          <a:lstStyle/>
-          <a:p>
-            <a:r>
-              <a:rPr lang="en-IN" dirty="0"/>
+          <a:bodyPr>
+            <a:normAutofit/>
+          </a:bodyPr>
+          <a:lstStyle/>
+          <a:p>
+            <a:r>
+              <a:rPr lang="en-IN" sz="4000" dirty="0"/>
               <a:t>Mail Sequence:</a:t>
             </a:r>
           </a:p>
@@ -7321,16 +7318,18 @@
         </p:nvSpPr>
         <p:spPr>
           <a:xfrm>
-            <a:off x="20053" y="152400"/>
-            <a:ext cx="8229600" cy="1143000"/>
-          </a:xfrm>
-        </p:spPr>
-        <p:txBody>
-          <a:bodyPr/>
-          <a:lstStyle/>
-          <a:p>
-            <a:r>
-              <a:rPr lang="en-IN" dirty="0"/>
+            <a:off x="304799" y="152400"/>
+            <a:ext cx="7944853" cy="1143000"/>
+          </a:xfrm>
+        </p:spPr>
+        <p:txBody>
+          <a:bodyPr>
+            <a:normAutofit/>
+          </a:bodyPr>
+          <a:lstStyle/>
+          <a:p>
+            <a:r>
+              <a:rPr lang="en-IN" sz="4000" dirty="0"/>
               <a:t>Read one mail</a:t>
             </a:r>
           </a:p>
@@ -7419,11 +7418,13 @@
           </a:xfrm>
         </p:spPr>
         <p:txBody>
-          <a:bodyPr/>
-          <a:lstStyle/>
-          <a:p>
-            <a:r>
-              <a:rPr lang="en-IN" dirty="0"/>
+          <a:bodyPr>
+            <a:normAutofit/>
+          </a:bodyPr>
+          <a:lstStyle/>
+          <a:p>
+            <a:r>
+              <a:rPr lang="en-IN" sz="4000" dirty="0"/>
               <a:t>Activities</a:t>
             </a:r>
           </a:p>
@@ -7613,11 +7614,13 @@
           </a:xfrm>
         </p:spPr>
         <p:txBody>
-          <a:bodyPr/>
-          <a:lstStyle/>
-          <a:p>
-            <a:r>
-              <a:rPr lang="en-IN" dirty="0"/>
+          <a:bodyPr>
+            <a:normAutofit/>
+          </a:bodyPr>
+          <a:lstStyle/>
+          <a:p>
+            <a:r>
+              <a:rPr lang="en-IN" sz="4000" dirty="0"/>
               <a:t>Query to customer support</a:t>
             </a:r>
           </a:p>
@@ -7705,13 +7708,20 @@
             <p:ph type="title"/>
           </p:nvPr>
         </p:nvSpPr>
-        <p:spPr/>
-        <p:txBody>
-          <a:bodyPr/>
-          <a:lstStyle/>
-          <a:p>
-            <a:r>
-              <a:rPr lang="en-IN" dirty="0"/>
+        <p:spPr>
+          <a:xfrm>
+            <a:off x="304800" y="225809"/>
+            <a:ext cx="8229600" cy="1143000"/>
+          </a:xfrm>
+        </p:spPr>
+        <p:txBody>
+          <a:bodyPr>
+            <a:normAutofit/>
+          </a:bodyPr>
+          <a:lstStyle/>
+          <a:p>
+            <a:r>
+              <a:rPr lang="en-IN" sz="4000" dirty="0"/>
               <a:t>Output</a:t>
             </a:r>
           </a:p>
@@ -7739,8 +7749,8 @@
         </p:blipFill>
         <p:spPr>
           <a:xfrm>
-            <a:off x="0" y="1981200"/>
-            <a:ext cx="9067800" cy="3657600"/>
+            <a:off x="190500" y="1600200"/>
+            <a:ext cx="8763000" cy="3657600"/>
           </a:xfrm>
           <a:prstGeom prst="rect">
             <a:avLst/>
@@ -7957,11 +7967,13 @@
           </a:xfrm>
         </p:spPr>
         <p:txBody>
-          <a:bodyPr/>
-          <a:lstStyle/>
-          <a:p>
-            <a:r>
-              <a:rPr lang="en-IN" dirty="0"/>
+          <a:bodyPr>
+            <a:normAutofit/>
+          </a:bodyPr>
+          <a:lstStyle/>
+          <a:p>
+            <a:r>
+              <a:rPr lang="en-IN" sz="4000" dirty="0"/>
               <a:t>Process Mail</a:t>
             </a:r>
           </a:p>
@@ -8016,18 +8028,18 @@
         </p:spPr>
         <p:txBody>
           <a:bodyPr>
-            <a:normAutofit fontScale="90000"/>
+            <a:noAutofit/>
           </a:bodyPr>
           <a:lstStyle/>
           <a:p>
             <a:r>
-              <a:rPr lang="en-IN" b="1" dirty="0"/>
+              <a:rPr lang="en-IN" sz="4000" dirty="0"/>
               <a:t>Text Summarization Steps</a:t>
             </a:r>
             <a:br>
-              <a:rPr lang="en-IN" b="1" dirty="0"/>
+              <a:rPr lang="en-IN" sz="4000" dirty="0"/>
             </a:br>
-            <a:endParaRPr lang="en-IN" dirty="0"/>
+            <a:endParaRPr lang="en-IN" sz="4000" dirty="0"/>
           </a:p>
         </p:txBody>
       </p:sp>
@@ -8658,7 +8670,7 @@
         </p:nvSpPr>
         <p:spPr>
           <a:xfrm>
-            <a:off x="304800" y="1066800"/>
+            <a:off x="304800" y="685800"/>
             <a:ext cx="8229600" cy="4800600"/>
           </a:xfrm>
         </p:spPr>
@@ -8935,11 +8947,13 @@
         </p:nvSpPr>
         <p:spPr/>
         <p:txBody>
-          <a:bodyPr/>
-          <a:lstStyle/>
-          <a:p>
-            <a:r>
-              <a:rPr lang="en-IN" dirty="0"/>
+          <a:bodyPr>
+            <a:normAutofit/>
+          </a:bodyPr>
+          <a:lstStyle/>
+          <a:p>
+            <a:r>
+              <a:rPr lang="en-IN" sz="4000" dirty="0"/>
               <a:t>Text summary</a:t>
             </a:r>
           </a:p>
@@ -9029,11 +9043,13 @@
         </p:nvSpPr>
         <p:spPr/>
         <p:txBody>
-          <a:bodyPr/>
-          <a:lstStyle/>
-          <a:p>
-            <a:r>
-              <a:rPr lang="en-IN" dirty="0"/>
+          <a:bodyPr>
+            <a:normAutofit/>
+          </a:bodyPr>
+          <a:lstStyle/>
+          <a:p>
+            <a:r>
+              <a:rPr lang="en-IN" sz="4000" dirty="0"/>
               <a:t>Extract summary</a:t>
             </a:r>
           </a:p>
@@ -9208,11 +9224,13 @@
           </a:xfrm>
         </p:spPr>
         <p:txBody>
-          <a:bodyPr/>
-          <a:lstStyle/>
-          <a:p>
-            <a:r>
-              <a:rPr lang="en-IN" dirty="0"/>
+          <a:bodyPr>
+            <a:normAutofit/>
+          </a:bodyPr>
+          <a:lstStyle/>
+          <a:p>
+            <a:r>
+              <a:rPr lang="en-IN" sz="4000" dirty="0"/>
               <a:t>Check Mail</a:t>
             </a:r>
           </a:p>
@@ -9296,11 +9314,13 @@
           </a:xfrm>
         </p:spPr>
         <p:txBody>
-          <a:bodyPr/>
-          <a:lstStyle/>
-          <a:p>
-            <a:r>
-              <a:rPr lang="en-IN" dirty="0"/>
+          <a:bodyPr>
+            <a:normAutofit/>
+          </a:bodyPr>
+          <a:lstStyle/>
+          <a:p>
+            <a:r>
+              <a:rPr lang="en-IN" sz="4000" dirty="0"/>
               <a:t>Keyword to keyword match:</a:t>
             </a:r>
           </a:p>
@@ -9389,11 +9409,13 @@
           </a:xfrm>
         </p:spPr>
         <p:txBody>
-          <a:bodyPr/>
-          <a:lstStyle/>
-          <a:p>
-            <a:r>
-              <a:rPr lang="en-IN" dirty="0"/>
+          <a:bodyPr>
+            <a:normAutofit/>
+          </a:bodyPr>
+          <a:lstStyle/>
+          <a:p>
+            <a:r>
+              <a:rPr lang="en-IN" sz="4000" dirty="0"/>
               <a:t>Keyword to summary match:</a:t>
             </a:r>
           </a:p>
@@ -9527,11 +9549,13 @@
           </a:xfrm>
         </p:spPr>
         <p:txBody>
-          <a:bodyPr/>
-          <a:lstStyle/>
-          <a:p>
-            <a:r>
-              <a:rPr lang="en-IN" dirty="0"/>
+          <a:bodyPr>
+            <a:normAutofit/>
+          </a:bodyPr>
+          <a:lstStyle/>
+          <a:p>
+            <a:r>
+              <a:rPr lang="en-IN" sz="4000" dirty="0"/>
               <a:t>Data Store</a:t>
             </a:r>
           </a:p>
@@ -9660,11 +9684,13 @@
           </a:xfrm>
         </p:spPr>
         <p:txBody>
-          <a:bodyPr/>
-          <a:lstStyle/>
-          <a:p>
-            <a:r>
-              <a:rPr lang="en-IN" dirty="0"/>
+          <a:bodyPr>
+            <a:normAutofit/>
+          </a:bodyPr>
+          <a:lstStyle/>
+          <a:p>
+            <a:r>
+              <a:rPr lang="en-IN" sz="4000" dirty="0"/>
               <a:t>Database (Excel)</a:t>
             </a:r>
           </a:p>
@@ -9798,11 +9824,13 @@
           </a:xfrm>
         </p:spPr>
         <p:txBody>
-          <a:bodyPr/>
-          <a:lstStyle/>
-          <a:p>
-            <a:r>
-              <a:rPr lang="en-IN" dirty="0"/>
+          <a:bodyPr>
+            <a:normAutofit/>
+          </a:bodyPr>
+          <a:lstStyle/>
+          <a:p>
+            <a:r>
+              <a:rPr lang="en-IN" sz="4000" dirty="0"/>
               <a:t>Template Mail</a:t>
             </a:r>
           </a:p>
@@ -9856,33 +9884,33 @@
         </p:spPr>
         <p:txBody>
           <a:bodyPr>
-            <a:normAutofit fontScale="90000"/>
+            <a:noAutofit/>
           </a:bodyPr>
           <a:lstStyle/>
           <a:p>
             <a:br>
               <a:rPr lang="en-US" sz="4000" dirty="0">
-                <a:latin typeface="Cambria" pitchFamily="18" charset="0"/>
+                <a:latin typeface="Calibri (Headings)"/>
               </a:rPr>
             </a:br>
             <a:br>
               <a:rPr lang="en-US" sz="4000" dirty="0">
-                <a:latin typeface="Cambria" pitchFamily="18" charset="0"/>
+                <a:latin typeface="Calibri (Headings)"/>
               </a:rPr>
             </a:br>
             <a:br>
               <a:rPr lang="en-US" sz="4000" dirty="0">
-                <a:latin typeface="Cambria" pitchFamily="18" charset="0"/>
+                <a:latin typeface="Calibri (Headings)"/>
               </a:rPr>
             </a:br>
             <a:br>
               <a:rPr lang="en-US" sz="4000" dirty="0">
-                <a:latin typeface="Cambria" pitchFamily="18" charset="0"/>
+                <a:latin typeface="Calibri (Headings)"/>
               </a:rPr>
             </a:br>
             <a:r>
               <a:rPr lang="en-US" sz="4000" dirty="0">
-                <a:latin typeface="Cambria" pitchFamily="18" charset="0"/>
+                <a:latin typeface="Calibri (Headings)"/>
               </a:rPr>
               <a:t>Area Introduction-Existing system </a:t>
             </a:r>
@@ -9890,7 +9918,7 @@
               <a:solidFill>
                 <a:schemeClr val="tx1"/>
               </a:solidFill>
-              <a:latin typeface="Cambria" pitchFamily="18" charset="0"/>
+              <a:latin typeface="Calibri (Headings)"/>
             </a:endParaRPr>
           </a:p>
         </p:txBody>
@@ -9948,7 +9976,7 @@
         </p:nvSpPr>
         <p:spPr>
           <a:xfrm>
-            <a:off x="457200" y="1993880"/>
+            <a:off x="304800" y="1929958"/>
             <a:ext cx="8153400" cy="4293483"/>
           </a:xfrm>
           <a:prstGeom prst="rect">
@@ -10215,11 +10243,13 @@
           </a:xfrm>
         </p:spPr>
         <p:txBody>
-          <a:bodyPr/>
-          <a:lstStyle/>
-          <a:p>
-            <a:r>
-              <a:rPr lang="en-IN" dirty="0"/>
+          <a:bodyPr>
+            <a:normAutofit/>
+          </a:bodyPr>
+          <a:lstStyle/>
+          <a:p>
+            <a:r>
+              <a:rPr lang="en-IN" sz="4000" dirty="0"/>
               <a:t>Ticket Raising</a:t>
             </a:r>
           </a:p>
@@ -10349,15 +10379,17 @@
         <p:spPr>
           <a:xfrm>
             <a:off x="457200" y="381000"/>
-            <a:ext cx="8229600" cy="990600"/>
-          </a:xfrm>
-        </p:spPr>
-        <p:txBody>
-          <a:bodyPr/>
-          <a:lstStyle/>
-          <a:p>
-            <a:r>
-              <a:rPr lang="en-IN" dirty="0"/>
+            <a:ext cx="8229600" cy="762000"/>
+          </a:xfrm>
+        </p:spPr>
+        <p:txBody>
+          <a:bodyPr>
+            <a:normAutofit/>
+          </a:bodyPr>
+          <a:lstStyle/>
+          <a:p>
+            <a:r>
+              <a:rPr lang="en-IN" sz="4000" dirty="0"/>
               <a:t>Support Team</a:t>
             </a:r>
           </a:p>
@@ -10491,11 +10523,13 @@
           </a:xfrm>
         </p:spPr>
         <p:txBody>
-          <a:bodyPr/>
-          <a:lstStyle/>
-          <a:p>
-            <a:r>
-              <a:rPr lang="en-IN" dirty="0"/>
+          <a:bodyPr>
+            <a:normAutofit/>
+          </a:bodyPr>
+          <a:lstStyle/>
+          <a:p>
+            <a:r>
+              <a:rPr lang="en-IN" sz="4000" dirty="0"/>
               <a:t>Ticket Closing</a:t>
             </a:r>
           </a:p>
@@ -10563,8 +10597,8 @@
               <a:buNone/>
             </a:pPr>
             <a:r>
-              <a:rPr lang="en-US" sz="2800" dirty="0">
-                <a:latin typeface="Cambria" pitchFamily="18" charset="0"/>
+              <a:rPr lang="en-US" sz="4300" dirty="0">
+                <a:latin typeface="+mj-lt"/>
               </a:rPr>
               <a:t>References</a:t>
             </a:r>
@@ -10619,17 +10653,8 @@
               <a:rPr lang="en-US" dirty="0">
                 <a:latin typeface="Cambria" pitchFamily="18" charset="0"/>
               </a:rPr>
-              <a:t> – </a:t>
-            </a:r>
-            <a:r>
-              <a:rPr lang="en-US" dirty="0" err="1">
-                <a:latin typeface="Cambria" pitchFamily="18" charset="0"/>
-              </a:rPr>
-              <a:t>Uipath</a:t>
-            </a:r>
-            <a:endParaRPr lang="en-US" dirty="0">
-              <a:latin typeface="Cambria" pitchFamily="18" charset="0"/>
-            </a:endParaRPr>
+              <a:t> – UiPath</a:t>
+            </a:r>
           </a:p>
           <a:p>
             <a:pPr lvl="1">
@@ -10661,20 +10686,11 @@
             </a:r>
           </a:p>
           <a:p>
-            <a:pPr marL="393192" lvl="1" indent="0">
+            <a:pPr lvl="1">
               <a:buClrTx/>
               <a:buSzPct val="70000"/>
-              <a:buNone/>
-            </a:pPr>
-            <a:endParaRPr lang="en-IN" dirty="0">
-              <a:latin typeface="Cambria" pitchFamily="18" charset="0"/>
-            </a:endParaRPr>
-          </a:p>
-          <a:p>
-            <a:pPr marL="393192" lvl="1" indent="0">
-              <a:buClrTx/>
-              <a:buSzPct val="70000"/>
-              <a:buNone/>
+              <a:buFont typeface="Wingdings" panose="05000000000000000000" pitchFamily="2" charset="2"/>
+              <a:buChar char="§"/>
             </a:pPr>
             <a:endParaRPr lang="en-IN" dirty="0">
               <a:latin typeface="Cambria" pitchFamily="18" charset="0"/>
@@ -10814,7 +10830,7 @@
         </p:nvSpPr>
         <p:spPr>
           <a:xfrm>
-            <a:off x="381000" y="932688"/>
+            <a:off x="457200" y="762000"/>
             <a:ext cx="8229600" cy="515112"/>
           </a:xfrm>
         </p:spPr>
@@ -10825,9 +10841,7 @@
           <a:lstStyle/>
           <a:p>
             <a:r>
-              <a:rPr lang="en-US" sz="4400" dirty="0">
-                <a:latin typeface="Cambria" pitchFamily="18" charset="0"/>
-              </a:rPr>
+              <a:rPr lang="en-US" sz="4400" dirty="0"/>
               <a:t>Proposed System</a:t>
             </a:r>
           </a:p>
@@ -10880,7 +10894,7 @@
         </p:nvSpPr>
         <p:spPr>
           <a:xfrm>
-            <a:off x="914400" y="1523286"/>
+            <a:off x="685800" y="1476399"/>
             <a:ext cx="8001000" cy="4801314"/>
           </a:xfrm>
           <a:prstGeom prst="rect">
@@ -11104,8 +11118,8 @@
               <a:buNone/>
             </a:pPr>
             <a:r>
-              <a:rPr lang="en-US" b="1" dirty="0">
-                <a:latin typeface="Cambria" pitchFamily="18" charset="0"/>
+              <a:rPr lang="en-US" sz="4000" b="1" dirty="0">
+                <a:latin typeface="+mj-lt"/>
               </a:rPr>
               <a:t>Advantage</a:t>
             </a:r>
@@ -11237,10 +11251,10 @@
               <a:buNone/>
             </a:pPr>
             <a:r>
-              <a:rPr lang="en-US" b="1" dirty="0">
-                <a:latin typeface="Cambria" pitchFamily="18" charset="0"/>
+              <a:rPr lang="en-US" sz="4000" b="1" dirty="0">
+                <a:latin typeface="+mj-lt"/>
               </a:rPr>
-              <a:t>future enhancements</a:t>
+              <a:t>Future enhancements</a:t>
             </a:r>
           </a:p>
           <a:p>
@@ -11354,14 +11368,9 @@
           <a:lstStyle/>
           <a:p>
             <a:r>
-              <a:rPr lang="en-US" sz="4400" dirty="0">
-                <a:latin typeface="Cambria" pitchFamily="18" charset="0"/>
-              </a:rPr>
+              <a:rPr lang="en-US" sz="4000" dirty="0"/>
               <a:t>Literature Review</a:t>
             </a:r>
-            <a:endParaRPr lang="en-US" sz="4000" dirty="0">
-              <a:latin typeface="Cambria" pitchFamily="18" charset="0"/>
-            </a:endParaRPr>
           </a:p>
         </p:txBody>
       </p:sp>
@@ -11558,8 +11567,8 @@
         </p:nvSpPr>
         <p:spPr>
           <a:xfrm>
-            <a:off x="381000" y="1295400"/>
-            <a:ext cx="8153400" cy="3962400"/>
+            <a:off x="381000" y="1600200"/>
+            <a:ext cx="8153400" cy="3276600"/>
           </a:xfrm>
         </p:spPr>
         <p:txBody>
@@ -11568,80 +11577,8 @@
           </a:bodyPr>
           <a:lstStyle/>
           <a:p>
-            <a:br>
-              <a:rPr lang="en-US" sz="1050" dirty="0">
-                <a:latin typeface="Cambria" pitchFamily="18" charset="0"/>
-              </a:rPr>
-            </a:br>
-            <a:br>
-              <a:rPr lang="en-US" sz="1050" dirty="0">
-                <a:latin typeface="Cambria" pitchFamily="18" charset="0"/>
-              </a:rPr>
-            </a:br>
-            <a:br>
-              <a:rPr lang="en-US" sz="1050" dirty="0">
-                <a:latin typeface="Cambria" pitchFamily="18" charset="0"/>
-              </a:rPr>
-            </a:br>
-            <a:br>
-              <a:rPr lang="en-US" sz="1050" dirty="0">
-                <a:latin typeface="Cambria" pitchFamily="18" charset="0"/>
-              </a:rPr>
-            </a:br>
-            <a:br>
-              <a:rPr lang="en-US" sz="1050" dirty="0">
-                <a:latin typeface="Cambria" pitchFamily="18" charset="0"/>
-              </a:rPr>
-            </a:br>
-            <a:br>
-              <a:rPr lang="en-US" sz="1050" dirty="0">
-                <a:latin typeface="Cambria" pitchFamily="18" charset="0"/>
-              </a:rPr>
-            </a:br>
-            <a:br>
-              <a:rPr lang="en-US" sz="1050" dirty="0">
-                <a:latin typeface="Cambria" pitchFamily="18" charset="0"/>
-              </a:rPr>
-            </a:br>
-            <a:br>
-              <a:rPr lang="en-US" sz="1050" dirty="0">
-                <a:latin typeface="Cambria" pitchFamily="18" charset="0"/>
-              </a:rPr>
-            </a:br>
-            <a:br>
-              <a:rPr lang="en-US" sz="1050" dirty="0">
-                <a:latin typeface="Cambria" pitchFamily="18" charset="0"/>
-              </a:rPr>
-            </a:br>
-            <a:br>
-              <a:rPr lang="en-US" sz="1050" dirty="0">
-                <a:latin typeface="Cambria" pitchFamily="18" charset="0"/>
-              </a:rPr>
-            </a:br>
-            <a:br>
-              <a:rPr lang="en-US" sz="1050" dirty="0">
-                <a:latin typeface="Cambria" pitchFamily="18" charset="0"/>
-              </a:rPr>
-            </a:br>
-            <a:br>
-              <a:rPr lang="en-US" sz="1050" dirty="0">
-                <a:latin typeface="Cambria" pitchFamily="18" charset="0"/>
-              </a:rPr>
-            </a:br>
-            <a:br>
-              <a:rPr lang="en-US" sz="1050" dirty="0">
-                <a:latin typeface="Cambria" pitchFamily="18" charset="0"/>
-              </a:rPr>
-            </a:br>
-            <a:br>
-              <a:rPr lang="en-US" sz="1050" dirty="0">
-                <a:latin typeface="Cambria" pitchFamily="18" charset="0"/>
-              </a:rPr>
-            </a:br>
-            <a:r>
-              <a:rPr lang="en-US" sz="3600" dirty="0">
-                <a:latin typeface="Cambria" pitchFamily="18" charset="0"/>
-              </a:rPr>
+            <a:r>
+              <a:rPr lang="en-US" sz="4000" dirty="0"/>
               <a:t>Module Split up</a:t>
             </a:r>
             <a:br>
@@ -11913,21 +11850,13 @@
         </p:spPr>
         <p:txBody>
           <a:bodyPr>
-            <a:normAutofit fontScale="90000"/>
+            <a:normAutofit/>
           </a:bodyPr>
           <a:lstStyle/>
           <a:p>
             <a:r>
-              <a:rPr lang="en-US" sz="4400" dirty="0">
-                <a:latin typeface="Cambria" pitchFamily="18" charset="0"/>
-              </a:rPr>
-              <a:t>   Project Planner / </a:t>
-            </a:r>
-            <a:r>
-              <a:rPr lang="en-US" sz="4000" dirty="0">
-                <a:latin typeface="Cambria" pitchFamily="18" charset="0"/>
-              </a:rPr>
-              <a:t>Timeline chart)    </a:t>
+              <a:rPr lang="en-US" sz="4000" dirty="0"/>
+              <a:t>   Project Planner / Timeline chart)    </a:t>
             </a:r>
           </a:p>
         </p:txBody>

</xml_diff>